<commit_message>
Moved boxes in scema for better visibilits
</commit_message>
<xml_diff>
--- a/Diagramms/IoT_Concept_Basic_Architecture.pptx
+++ b/Diagramms/IoT_Concept_Basic_Architecture.pptx
@@ -197,7 +197,7 @@
           <a:p>
             <a:fld id="{98E5A0E9-E8EB-4B2F-B9FE-EA71FB6CA681}" type="datetimeFigureOut">
               <a:rPr lang="de-DE" smtClean="0"/>
-              <a:t>17.07.2020</a:t>
+              <a:t>20.07.2020</a:t>
             </a:fld>
             <a:endParaRPr lang="de-DE"/>
           </a:p>
@@ -611,7 +611,7 @@
           <a:p>
             <a:fld id="{B2781510-CB02-4453-BCA8-C07E5FD3A014}" type="datetimeFigureOut">
               <a:rPr lang="de-DE" smtClean="0"/>
-              <a:t>17.07.2020</a:t>
+              <a:t>20.07.2020</a:t>
             </a:fld>
             <a:endParaRPr lang="de-DE"/>
           </a:p>
@@ -809,7 +809,7 @@
           <a:p>
             <a:fld id="{B2781510-CB02-4453-BCA8-C07E5FD3A014}" type="datetimeFigureOut">
               <a:rPr lang="de-DE" smtClean="0"/>
-              <a:t>17.07.2020</a:t>
+              <a:t>20.07.2020</a:t>
             </a:fld>
             <a:endParaRPr lang="de-DE"/>
           </a:p>
@@ -1017,7 +1017,7 @@
           <a:p>
             <a:fld id="{B2781510-CB02-4453-BCA8-C07E5FD3A014}" type="datetimeFigureOut">
               <a:rPr lang="de-DE" smtClean="0"/>
-              <a:t>17.07.2020</a:t>
+              <a:t>20.07.2020</a:t>
             </a:fld>
             <a:endParaRPr lang="de-DE"/>
           </a:p>
@@ -1215,7 +1215,7 @@
           <a:p>
             <a:fld id="{B2781510-CB02-4453-BCA8-C07E5FD3A014}" type="datetimeFigureOut">
               <a:rPr lang="de-DE" smtClean="0"/>
-              <a:t>17.07.2020</a:t>
+              <a:t>20.07.2020</a:t>
             </a:fld>
             <a:endParaRPr lang="de-DE"/>
           </a:p>
@@ -1490,7 +1490,7 @@
           <a:p>
             <a:fld id="{B2781510-CB02-4453-BCA8-C07E5FD3A014}" type="datetimeFigureOut">
               <a:rPr lang="de-DE" smtClean="0"/>
-              <a:t>17.07.2020</a:t>
+              <a:t>20.07.2020</a:t>
             </a:fld>
             <a:endParaRPr lang="de-DE"/>
           </a:p>
@@ -1755,7 +1755,7 @@
           <a:p>
             <a:fld id="{B2781510-CB02-4453-BCA8-C07E5FD3A014}" type="datetimeFigureOut">
               <a:rPr lang="de-DE" smtClean="0"/>
-              <a:t>17.07.2020</a:t>
+              <a:t>20.07.2020</a:t>
             </a:fld>
             <a:endParaRPr lang="de-DE"/>
           </a:p>
@@ -2167,7 +2167,7 @@
           <a:p>
             <a:fld id="{B2781510-CB02-4453-BCA8-C07E5FD3A014}" type="datetimeFigureOut">
               <a:rPr lang="de-DE" smtClean="0"/>
-              <a:t>17.07.2020</a:t>
+              <a:t>20.07.2020</a:t>
             </a:fld>
             <a:endParaRPr lang="de-DE"/>
           </a:p>
@@ -2308,7 +2308,7 @@
           <a:p>
             <a:fld id="{B2781510-CB02-4453-BCA8-C07E5FD3A014}" type="datetimeFigureOut">
               <a:rPr lang="de-DE" smtClean="0"/>
-              <a:t>17.07.2020</a:t>
+              <a:t>20.07.2020</a:t>
             </a:fld>
             <a:endParaRPr lang="de-DE"/>
           </a:p>
@@ -2421,7 +2421,7 @@
           <a:p>
             <a:fld id="{B2781510-CB02-4453-BCA8-C07E5FD3A014}" type="datetimeFigureOut">
               <a:rPr lang="de-DE" smtClean="0"/>
-              <a:t>17.07.2020</a:t>
+              <a:t>20.07.2020</a:t>
             </a:fld>
             <a:endParaRPr lang="de-DE"/>
           </a:p>
@@ -2732,7 +2732,7 @@
           <a:p>
             <a:fld id="{B2781510-CB02-4453-BCA8-C07E5FD3A014}" type="datetimeFigureOut">
               <a:rPr lang="de-DE" smtClean="0"/>
-              <a:t>17.07.2020</a:t>
+              <a:t>20.07.2020</a:t>
             </a:fld>
             <a:endParaRPr lang="de-DE"/>
           </a:p>
@@ -3020,7 +3020,7 @@
           <a:p>
             <a:fld id="{B2781510-CB02-4453-BCA8-C07E5FD3A014}" type="datetimeFigureOut">
               <a:rPr lang="de-DE" smtClean="0"/>
-              <a:t>17.07.2020</a:t>
+              <a:t>20.07.2020</a:t>
             </a:fld>
             <a:endParaRPr lang="de-DE"/>
           </a:p>
@@ -3261,7 +3261,7 @@
           <a:p>
             <a:fld id="{B2781510-CB02-4453-BCA8-C07E5FD3A014}" type="datetimeFigureOut">
               <a:rPr lang="de-DE" smtClean="0"/>
-              <a:t>17.07.2020</a:t>
+              <a:t>20.07.2020</a:t>
             </a:fld>
             <a:endParaRPr lang="de-DE"/>
           </a:p>
@@ -3741,7 +3741,7 @@
         </p:nvGrpSpPr>
         <p:grpSpPr>
           <a:xfrm>
-            <a:off x="9402099" y="2925345"/>
+            <a:off x="9902909" y="2927845"/>
             <a:ext cx="2100076" cy="1702992"/>
             <a:chOff x="8380735" y="3109379"/>
             <a:chExt cx="2100076" cy="1702992"/>
@@ -4206,7 +4206,6 @@
           <a:bodyPr rtlCol="0" anchor="b"/>
           <a:lstStyle/>
           <a:p>
-            <a:pPr algn="ctr"/>
             <a:r>
               <a:rPr lang="de-DE" sz="1200" dirty="0"/>
               <a:t>Hypervisor Type 1 </a:t>
@@ -4299,15 +4298,7 @@
             </a:r>
             <a:r>
               <a:rPr lang="de-DE" sz="1200" dirty="0"/>
-              <a:t> </a:t>
-            </a:r>
-            <a:r>
-              <a:rPr lang="de-DE" sz="1200" dirty="0" err="1"/>
-              <a:t>existing</a:t>
-            </a:r>
-            <a:r>
-              <a:rPr lang="de-DE" sz="1200" dirty="0"/>
-              <a:t>)</a:t>
+              <a:t> existent)</a:t>
             </a:r>
           </a:p>
         </p:txBody>
@@ -4829,7 +4820,7 @@
         </p:nvSpPr>
         <p:spPr>
           <a:xfrm>
-            <a:off x="5866164" y="2308692"/>
+            <a:off x="5950054" y="2317081"/>
             <a:ext cx="755009" cy="369332"/>
           </a:xfrm>
           <a:prstGeom prst="rect">
@@ -5409,7 +5400,7 @@
         </p:nvGrpSpPr>
         <p:grpSpPr>
           <a:xfrm>
-            <a:off x="8549083" y="5244542"/>
+            <a:off x="7600875" y="5243720"/>
             <a:ext cx="98856" cy="101457"/>
             <a:chOff x="8086446" y="1200293"/>
             <a:chExt cx="1033742" cy="1060936"/>
@@ -5520,7 +5511,7 @@
         </p:nvGrpSpPr>
         <p:grpSpPr>
           <a:xfrm>
-            <a:off x="8381746" y="5244542"/>
+            <a:off x="7433538" y="5243720"/>
             <a:ext cx="98856" cy="101457"/>
             <a:chOff x="8086446" y="1200293"/>
             <a:chExt cx="1033742" cy="1060936"/>
@@ -5631,7 +5622,7 @@
         </p:nvGrpSpPr>
         <p:grpSpPr>
           <a:xfrm>
-            <a:off x="8215265" y="5244542"/>
+            <a:off x="7259437" y="5243720"/>
             <a:ext cx="98856" cy="101457"/>
             <a:chOff x="8086446" y="1200293"/>
             <a:chExt cx="1033742" cy="1060936"/>
@@ -5739,19 +5730,19 @@
           </p:cNvPr>
           <p:cNvCxnSpPr>
             <a:cxnSpLocks/>
-            <a:stCxn id="183" idx="2"/>
-            <a:endCxn id="50" idx="2"/>
+            <a:stCxn id="177" idx="2"/>
+            <a:endCxn id="48" idx="2"/>
           </p:cNvCxnSpPr>
           <p:nvPr/>
         </p:nvCxnSpPr>
         <p:spPr>
-          <a:xfrm rot="5400000" flipH="1" flipV="1">
-            <a:off x="6906540" y="4578645"/>
-            <a:ext cx="757279" cy="2291988"/>
+          <a:xfrm rot="5400000" flipH="1">
+            <a:off x="7460164" y="5531417"/>
+            <a:ext cx="767825" cy="385623"/>
           </a:xfrm>
           <a:prstGeom prst="bentConnector3">
             <a:avLst>
-              <a:gd name="adj1" fmla="val -30187"/>
+              <a:gd name="adj1" fmla="val -29772"/>
             </a:avLst>
           </a:prstGeom>
         </p:spPr>
@@ -5892,19 +5883,19 @@
           </p:cNvPr>
           <p:cNvCxnSpPr>
             <a:cxnSpLocks/>
-            <a:stCxn id="50" idx="0"/>
+            <a:stCxn id="47" idx="0"/>
             <a:endCxn id="64" idx="2"/>
           </p:cNvCxnSpPr>
           <p:nvPr/>
         </p:nvCxnSpPr>
         <p:spPr>
           <a:xfrm rot="16200000" flipV="1">
-            <a:off x="6789959" y="3603326"/>
-            <a:ext cx="1282892" cy="1999539"/>
+            <a:off x="6399934" y="3993351"/>
+            <a:ext cx="1282070" cy="1218668"/>
           </a:xfrm>
           <a:prstGeom prst="bentConnector3">
             <a:avLst>
-              <a:gd name="adj1" fmla="val 54455"/>
+              <a:gd name="adj1" fmla="val 50000"/>
             </a:avLst>
           </a:prstGeom>
           <a:ln w="9525" cap="flat" cmpd="sng" algn="ctr">
@@ -5943,19 +5934,19 @@
           </p:cNvPr>
           <p:cNvCxnSpPr>
             <a:cxnSpLocks/>
-            <a:stCxn id="50" idx="0"/>
+            <a:stCxn id="47" idx="0"/>
             <a:endCxn id="35" idx="2"/>
           </p:cNvCxnSpPr>
           <p:nvPr/>
         </p:nvCxnSpPr>
         <p:spPr>
-          <a:xfrm rot="16200000" flipV="1">
-            <a:off x="7764873" y="4578240"/>
-            <a:ext cx="1258566" cy="74037"/>
+          <a:xfrm rot="5400000" flipH="1" flipV="1">
+            <a:off x="7374848" y="4261431"/>
+            <a:ext cx="1257744" cy="706834"/>
           </a:xfrm>
           <a:prstGeom prst="bentConnector3">
             <a:avLst>
-              <a:gd name="adj1" fmla="val 55171"/>
+              <a:gd name="adj1" fmla="val 50000"/>
             </a:avLst>
           </a:prstGeom>
         </p:spPr>
@@ -6608,18 +6599,18 @@
           <p:cNvCxnSpPr>
             <a:cxnSpLocks/>
             <a:stCxn id="120" idx="2"/>
-            <a:endCxn id="47" idx="0"/>
+            <a:endCxn id="50" idx="0"/>
           </p:cNvCxnSpPr>
           <p:nvPr/>
         </p:nvCxnSpPr>
         <p:spPr>
           <a:xfrm rot="16200000" flipH="1">
-            <a:off x="6940682" y="3586712"/>
-            <a:ext cx="1287871" cy="2027787"/>
+            <a:off x="6383321" y="4144074"/>
+            <a:ext cx="1287049" cy="912242"/>
           </a:xfrm>
           <a:prstGeom prst="bentConnector3">
             <a:avLst>
-              <a:gd name="adj1" fmla="val 40016"/>
+              <a:gd name="adj1" fmla="val 33458"/>
             </a:avLst>
           </a:prstGeom>
           <a:ln>
@@ -6657,18 +6648,18 @@
           <p:cNvCxnSpPr>
             <a:cxnSpLocks/>
             <a:stCxn id="39" idx="2"/>
-            <a:endCxn id="48" idx="2"/>
+            <a:endCxn id="51" idx="2"/>
           </p:cNvCxnSpPr>
           <p:nvPr/>
         </p:nvCxnSpPr>
         <p:spPr>
           <a:xfrm rot="5400000" flipH="1" flipV="1">
-            <a:off x="6375185" y="3872077"/>
-            <a:ext cx="755228" cy="3693348"/>
+            <a:off x="5817001" y="4429438"/>
+            <a:ext cx="756050" cy="2577803"/>
           </a:xfrm>
           <a:prstGeom prst="bentConnector3">
             <a:avLst>
-              <a:gd name="adj1" fmla="val -55817"/>
+              <a:gd name="adj1" fmla="val -54647"/>
             </a:avLst>
           </a:prstGeom>
           <a:ln>
@@ -7147,12 +7138,12 @@
         </p:nvCxnSpPr>
         <p:spPr>
           <a:xfrm rot="16200000" flipV="1">
-            <a:off x="4869031" y="1848880"/>
-            <a:ext cx="1266347" cy="5524978"/>
+            <a:off x="4391528" y="2326383"/>
+            <a:ext cx="1265525" cy="4569150"/>
           </a:xfrm>
           <a:prstGeom prst="bentConnector3">
             <a:avLst>
-              <a:gd name="adj1" fmla="val 50000"/>
+              <a:gd name="adj1" fmla="val 42045"/>
             </a:avLst>
           </a:prstGeom>
         </p:spPr>
@@ -7264,12 +7255,12 @@
         </p:nvCxnSpPr>
         <p:spPr>
           <a:xfrm rot="5400000">
-            <a:off x="4879366" y="2710076"/>
-            <a:ext cx="755229" cy="6017351"/>
+            <a:off x="4401041" y="3187579"/>
+            <a:ext cx="756051" cy="5061523"/>
           </a:xfrm>
           <a:prstGeom prst="bentConnector3">
             <a:avLst>
-              <a:gd name="adj1" fmla="val 178033"/>
+              <a:gd name="adj1" fmla="val 177948"/>
             </a:avLst>
           </a:prstGeom>
         </p:spPr>
@@ -7337,7 +7328,7 @@
         </p:nvSpPr>
         <p:spPr>
           <a:xfrm rot="16200000">
-            <a:off x="10140534" y="5490190"/>
+            <a:off x="10542985" y="5503842"/>
             <a:ext cx="246918" cy="278990"/>
           </a:xfrm>
           <a:prstGeom prst="flowChartDelay">
@@ -7391,7 +7382,7 @@
         </p:nvCxnSpPr>
         <p:spPr>
           <a:xfrm>
-            <a:off x="10263993" y="5753144"/>
+            <a:off x="10666444" y="5766796"/>
             <a:ext cx="0" cy="654349"/>
           </a:xfrm>
           <a:prstGeom prst="line">
@@ -7434,7 +7425,7 @@
         </p:nvGrpSpPr>
         <p:grpSpPr>
           <a:xfrm>
-            <a:off x="10992780" y="5553537"/>
+            <a:off x="11389153" y="5542297"/>
             <a:ext cx="489686" cy="620702"/>
             <a:chOff x="10706099" y="2383629"/>
             <a:chExt cx="489686" cy="620702"/>
@@ -7739,7 +7730,7 @@
         </p:nvSpPr>
         <p:spPr>
           <a:xfrm>
-            <a:off x="9842521" y="5519878"/>
+            <a:off x="10227763" y="5519877"/>
             <a:ext cx="292388" cy="841319"/>
           </a:xfrm>
           <a:prstGeom prst="rect">
@@ -7775,7 +7766,7 @@
         </p:nvSpPr>
         <p:spPr>
           <a:xfrm>
-            <a:off x="10713291" y="5519878"/>
+            <a:off x="11102289" y="5519878"/>
             <a:ext cx="292388" cy="1325572"/>
           </a:xfrm>
           <a:prstGeom prst="rect">
@@ -7818,8 +7809,8 @@
         </p:nvCxnSpPr>
         <p:spPr>
           <a:xfrm rot="16200000" flipH="1">
-            <a:off x="9775799" y="5018031"/>
-            <a:ext cx="877889" cy="98500"/>
+            <a:off x="10221853" y="5075286"/>
+            <a:ext cx="889041" cy="141"/>
           </a:xfrm>
           <a:prstGeom prst="bentConnector3">
             <a:avLst/>
@@ -7858,12 +7849,12 @@
         </p:nvCxnSpPr>
         <p:spPr>
           <a:xfrm rot="16200000" flipH="1">
-            <a:off x="10420794" y="4736073"/>
-            <a:ext cx="925200" cy="709727"/>
+            <a:off x="10876256" y="4783922"/>
+            <a:ext cx="911460" cy="605290"/>
           </a:xfrm>
           <a:prstGeom prst="bentConnector3">
             <a:avLst>
-              <a:gd name="adj1" fmla="val 47136"/>
+              <a:gd name="adj1" fmla="val 50000"/>
             </a:avLst>
           </a:prstGeom>
         </p:spPr>
@@ -7993,51 +7984,6 @@
           </p:txBody>
         </p:sp>
       </p:grpSp>
-      <p:cxnSp>
-        <p:nvCxnSpPr>
-          <p:cNvPr id="6" name="Gerader Verbinder 5">
-            <a:extLst>
-              <a:ext uri="{FF2B5EF4-FFF2-40B4-BE49-F238E27FC236}">
-                <a16:creationId xmlns:a16="http://schemas.microsoft.com/office/drawing/2014/main" id="{72F8DFB0-62A3-4640-850E-B957CFEB2BE0}"/>
-              </a:ext>
-            </a:extLst>
-          </p:cNvPr>
-          <p:cNvCxnSpPr>
-            <a:stCxn id="105" idx="2"/>
-          </p:cNvCxnSpPr>
-          <p:nvPr/>
-        </p:nvCxnSpPr>
-        <p:spPr>
-          <a:xfrm>
-            <a:off x="8190649" y="3984852"/>
-            <a:ext cx="0" cy="479198"/>
-          </a:xfrm>
-          <a:prstGeom prst="line">
-            <a:avLst/>
-          </a:prstGeom>
-          <a:ln>
-            <a:solidFill>
-              <a:schemeClr val="accent6">
-                <a:lumMod val="50000"/>
-              </a:schemeClr>
-            </a:solidFill>
-          </a:ln>
-        </p:spPr>
-        <p:style>
-          <a:lnRef idx="3">
-            <a:schemeClr val="accent6"/>
-          </a:lnRef>
-          <a:fillRef idx="0">
-            <a:schemeClr val="accent6"/>
-          </a:fillRef>
-          <a:effectRef idx="2">
-            <a:schemeClr val="accent6"/>
-          </a:effectRef>
-          <a:fontRef idx="minor">
-            <a:schemeClr val="tx1"/>
-          </a:fontRef>
-        </p:style>
-      </p:cxnSp>
       <p:sp>
         <p:nvSpPr>
           <p:cNvPr id="7" name="Textfeld 6">
@@ -8052,7 +7998,7 @@
         </p:nvSpPr>
         <p:spPr>
           <a:xfrm>
-            <a:off x="9383569" y="4695728"/>
+            <a:off x="9889646" y="4664026"/>
             <a:ext cx="292388" cy="390492"/>
           </a:xfrm>
           <a:prstGeom prst="rect">
@@ -8298,7 +8244,7 @@
         </p:nvSpPr>
         <p:spPr>
           <a:xfrm>
-            <a:off x="4802059" y="6162999"/>
+            <a:off x="4912920" y="6114321"/>
             <a:ext cx="292388" cy="387286"/>
           </a:xfrm>
           <a:prstGeom prst="rect">
@@ -8307,7 +8253,7 @@
           <a:noFill/>
         </p:spPr>
         <p:txBody>
-          <a:bodyPr vert="vert270" wrap="none" rtlCol="0">
+          <a:bodyPr vert="vert270" wrap="square" rtlCol="0">
             <a:spAutoFit/>
           </a:bodyPr>
           <a:lstStyle/>
@@ -8333,7 +8279,7 @@
         </p:nvSpPr>
         <p:spPr>
           <a:xfrm>
-            <a:off x="9915344" y="4632334"/>
+            <a:off x="10421421" y="4664026"/>
             <a:ext cx="292388" cy="432170"/>
           </a:xfrm>
           <a:prstGeom prst="rect">
@@ -8369,7 +8315,7 @@
         </p:nvSpPr>
         <p:spPr>
           <a:xfrm>
-            <a:off x="10297640" y="4667379"/>
+            <a:off x="10803717" y="4664026"/>
             <a:ext cx="292388" cy="299121"/>
           </a:xfrm>
           <a:prstGeom prst="rect">
@@ -8931,7 +8877,7 @@
         </p:nvGrpSpPr>
         <p:grpSpPr>
           <a:xfrm>
-            <a:off x="5131132" y="5641508"/>
+            <a:off x="7925335" y="5641508"/>
             <a:ext cx="1106033" cy="486560"/>
             <a:chOff x="6430673" y="5635248"/>
             <a:chExt cx="1106033" cy="486560"/>
@@ -9629,19 +9575,19 @@
           </p:cNvPr>
           <p:cNvCxnSpPr>
             <a:cxnSpLocks/>
-            <a:stCxn id="163" idx="2"/>
+            <a:stCxn id="174" idx="2"/>
             <a:endCxn id="23" idx="2"/>
           </p:cNvCxnSpPr>
           <p:nvPr/>
         </p:nvCxnSpPr>
         <p:spPr>
           <a:xfrm rot="5400000" flipH="1" flipV="1">
-            <a:off x="7044298" y="3524341"/>
-            <a:ext cx="1522765" cy="3644833"/>
+            <a:off x="8401082" y="4380315"/>
+            <a:ext cx="1520265" cy="1935385"/>
           </a:xfrm>
           <a:prstGeom prst="bentConnector3">
             <a:avLst>
-              <a:gd name="adj1" fmla="val -15012"/>
+              <a:gd name="adj1" fmla="val -26625"/>
             </a:avLst>
           </a:prstGeom>
         </p:spPr>
@@ -9674,8 +9620,8 @@
         </p:nvSpPr>
         <p:spPr>
           <a:xfrm>
-            <a:off x="6368996" y="5641508"/>
-            <a:ext cx="1587865" cy="481113"/>
+            <a:off x="9199153" y="3503034"/>
+            <a:ext cx="694880" cy="1642603"/>
           </a:xfrm>
           <a:prstGeom prst="rect">
             <a:avLst/>
@@ -9698,7 +9644,7 @@
           </a:fontRef>
         </p:style>
         <p:txBody>
-          <a:bodyPr rtlCol="0" anchor="ctr"/>
+          <a:bodyPr vert="vert270" rtlCol="0" anchor="ctr"/>
           <a:lstStyle/>
           <a:p>
             <a:pPr algn="ctr"/>
@@ -9732,96 +9678,117 @@
           </a:p>
         </p:txBody>
       </p:sp>
-      <p:sp>
-        <p:nvSpPr>
-          <p:cNvPr id="189" name="Rechteck 188">
-            <a:extLst>
-              <a:ext uri="{FF2B5EF4-FFF2-40B4-BE49-F238E27FC236}">
-                <a16:creationId xmlns:a16="http://schemas.microsoft.com/office/drawing/2014/main" id="{53160F03-F081-420F-A368-297F9012B133}"/>
-              </a:ext>
-            </a:extLst>
-          </p:cNvPr>
-          <p:cNvSpPr/>
+      <p:grpSp>
+        <p:nvGrpSpPr>
+          <p:cNvPr id="15" name="Gruppieren 14">
+            <a:extLst>
+              <a:ext uri="{FF2B5EF4-FFF2-40B4-BE49-F238E27FC236}">
+                <a16:creationId xmlns:a16="http://schemas.microsoft.com/office/drawing/2014/main" id="{B93066E7-A0B2-4F8D-B460-8C37EA743A5E}"/>
+              </a:ext>
+            </a:extLst>
+          </p:cNvPr>
+          <p:cNvGrpSpPr/>
           <p:nvPr/>
-        </p:nvSpPr>
-        <p:spPr>
+        </p:nvGrpSpPr>
+        <p:grpSpPr>
           <a:xfrm>
-            <a:off x="7759300" y="5980076"/>
+            <a:off x="9709737" y="4978222"/>
             <a:ext cx="98856" cy="101457"/>
+            <a:chOff x="7759300" y="5980076"/>
+            <a:chExt cx="98856" cy="101457"/>
           </a:xfrm>
-          <a:prstGeom prst="rect">
-            <a:avLst/>
-          </a:prstGeom>
-        </p:spPr>
-        <p:style>
-          <a:lnRef idx="1">
-            <a:schemeClr val="dk1"/>
-          </a:lnRef>
-          <a:fillRef idx="2">
-            <a:schemeClr val="dk1"/>
-          </a:fillRef>
-          <a:effectRef idx="1">
-            <a:schemeClr val="dk1"/>
-          </a:effectRef>
-          <a:fontRef idx="minor">
-            <a:schemeClr val="dk1"/>
-          </a:fontRef>
-        </p:style>
-        <p:txBody>
-          <a:bodyPr rtlCol="0" anchor="ctr"/>
-          <a:lstStyle/>
-          <a:p>
-            <a:pPr algn="ctr"/>
-            <a:endParaRPr lang="de-DE"/>
-          </a:p>
-        </p:txBody>
-      </p:sp>
-      <p:sp>
-        <p:nvSpPr>
-          <p:cNvPr id="190" name="Rechteck 189">
-            <a:extLst>
-              <a:ext uri="{FF2B5EF4-FFF2-40B4-BE49-F238E27FC236}">
-                <a16:creationId xmlns:a16="http://schemas.microsoft.com/office/drawing/2014/main" id="{C3009140-DCA3-4C2A-BD2B-26C3645A3CBC}"/>
-              </a:ext>
-            </a:extLst>
-          </p:cNvPr>
-          <p:cNvSpPr/>
-          <p:nvPr/>
-        </p:nvSpPr>
-        <p:spPr>
-          <a:xfrm>
-            <a:off x="7762765" y="6046542"/>
-            <a:ext cx="86001" cy="29204"/>
-          </a:xfrm>
-          <a:prstGeom prst="rect">
-            <a:avLst/>
-          </a:prstGeom>
-        </p:spPr>
-        <p:style>
-          <a:lnRef idx="2">
-            <a:schemeClr val="accent3">
-              <a:shade val="50000"/>
-            </a:schemeClr>
-          </a:lnRef>
-          <a:fillRef idx="1">
-            <a:schemeClr val="accent3"/>
-          </a:fillRef>
-          <a:effectRef idx="0">
-            <a:schemeClr val="accent3"/>
-          </a:effectRef>
-          <a:fontRef idx="minor">
-            <a:schemeClr val="lt1"/>
-          </a:fontRef>
-        </p:style>
-        <p:txBody>
-          <a:bodyPr rtlCol="0" anchor="ctr"/>
-          <a:lstStyle/>
-          <a:p>
-            <a:pPr algn="ctr"/>
-            <a:endParaRPr lang="de-DE"/>
-          </a:p>
-        </p:txBody>
-      </p:sp>
+        </p:grpSpPr>
+        <p:sp>
+          <p:nvSpPr>
+            <p:cNvPr id="189" name="Rechteck 188">
+              <a:extLst>
+                <a:ext uri="{FF2B5EF4-FFF2-40B4-BE49-F238E27FC236}">
+                  <a16:creationId xmlns:a16="http://schemas.microsoft.com/office/drawing/2014/main" id="{53160F03-F081-420F-A368-297F9012B133}"/>
+                </a:ext>
+              </a:extLst>
+            </p:cNvPr>
+            <p:cNvSpPr/>
+            <p:nvPr/>
+          </p:nvSpPr>
+          <p:spPr>
+            <a:xfrm>
+              <a:off x="7759300" y="5980076"/>
+              <a:ext cx="98856" cy="101457"/>
+            </a:xfrm>
+            <a:prstGeom prst="rect">
+              <a:avLst/>
+            </a:prstGeom>
+          </p:spPr>
+          <p:style>
+            <a:lnRef idx="1">
+              <a:schemeClr val="dk1"/>
+            </a:lnRef>
+            <a:fillRef idx="2">
+              <a:schemeClr val="dk1"/>
+            </a:fillRef>
+            <a:effectRef idx="1">
+              <a:schemeClr val="dk1"/>
+            </a:effectRef>
+            <a:fontRef idx="minor">
+              <a:schemeClr val="dk1"/>
+            </a:fontRef>
+          </p:style>
+          <p:txBody>
+            <a:bodyPr rtlCol="0" anchor="ctr"/>
+            <a:lstStyle/>
+            <a:p>
+              <a:pPr algn="ctr"/>
+              <a:endParaRPr lang="de-DE"/>
+            </a:p>
+          </p:txBody>
+        </p:sp>
+        <p:sp>
+          <p:nvSpPr>
+            <p:cNvPr id="190" name="Rechteck 189">
+              <a:extLst>
+                <a:ext uri="{FF2B5EF4-FFF2-40B4-BE49-F238E27FC236}">
+                  <a16:creationId xmlns:a16="http://schemas.microsoft.com/office/drawing/2014/main" id="{C3009140-DCA3-4C2A-BD2B-26C3645A3CBC}"/>
+                </a:ext>
+              </a:extLst>
+            </p:cNvPr>
+            <p:cNvSpPr/>
+            <p:nvPr/>
+          </p:nvSpPr>
+          <p:spPr>
+            <a:xfrm>
+              <a:off x="7765940" y="6046542"/>
+              <a:ext cx="86001" cy="29204"/>
+            </a:xfrm>
+            <a:prstGeom prst="rect">
+              <a:avLst/>
+            </a:prstGeom>
+          </p:spPr>
+          <p:style>
+            <a:lnRef idx="2">
+              <a:schemeClr val="accent3">
+                <a:shade val="50000"/>
+              </a:schemeClr>
+            </a:lnRef>
+            <a:fillRef idx="1">
+              <a:schemeClr val="accent3"/>
+            </a:fillRef>
+            <a:effectRef idx="0">
+              <a:schemeClr val="accent3"/>
+            </a:effectRef>
+            <a:fontRef idx="minor">
+              <a:schemeClr val="lt1"/>
+            </a:fontRef>
+          </p:style>
+          <p:txBody>
+            <a:bodyPr rtlCol="0" anchor="ctr"/>
+            <a:lstStyle/>
+            <a:p>
+              <a:pPr algn="ctr"/>
+              <a:endParaRPr lang="de-DE"/>
+            </a:p>
+          </p:txBody>
+        </p:sp>
+      </p:grpSp>
       <p:cxnSp>
         <p:nvCxnSpPr>
           <p:cNvPr id="194" name="Verbinder: gewinkelt 193">
@@ -9833,19 +9800,19 @@
           </p:cNvPr>
           <p:cNvCxnSpPr>
             <a:cxnSpLocks/>
-            <a:stCxn id="166" idx="2"/>
+            <a:stCxn id="173" idx="2"/>
             <a:endCxn id="190" idx="2"/>
           </p:cNvCxnSpPr>
           <p:nvPr/>
         </p:nvCxnSpPr>
         <p:spPr>
           <a:xfrm rot="5400000" flipH="1" flipV="1">
-            <a:off x="6805241" y="5102753"/>
-            <a:ext cx="27532" cy="1973517"/>
+            <a:off x="8533030" y="4875430"/>
+            <a:ext cx="1027885" cy="1424810"/>
           </a:xfrm>
           <a:prstGeom prst="bentConnector3">
             <a:avLst>
-              <a:gd name="adj1" fmla="val -830307"/>
+              <a:gd name="adj1" fmla="val -22240"/>
             </a:avLst>
           </a:prstGeom>
         </p:spPr>
@@ -9878,7 +9845,7 @@
         </p:nvSpPr>
         <p:spPr>
           <a:xfrm>
-            <a:off x="6127123" y="6130358"/>
+            <a:off x="7965641" y="6529401"/>
             <a:ext cx="482824" cy="200055"/>
           </a:xfrm>
           <a:prstGeom prst="rect">
@@ -9914,8 +9881,8 @@
         </p:nvSpPr>
         <p:spPr>
           <a:xfrm>
-            <a:off x="7353616" y="6130358"/>
-            <a:ext cx="482824" cy="200055"/>
+            <a:off x="9516205" y="5158377"/>
+            <a:ext cx="292388" cy="390492"/>
           </a:xfrm>
           <a:prstGeom prst="rect">
             <a:avLst/>
@@ -9923,7 +9890,7 @@
           <a:noFill/>
         </p:spPr>
         <p:txBody>
-          <a:bodyPr vert="horz" wrap="none" rtlCol="0">
+          <a:bodyPr vert="vert270" wrap="none" rtlCol="0">
             <a:spAutoFit/>
           </a:bodyPr>
           <a:lstStyle/>
@@ -9995,7 +9962,7 @@
           <a:p>
             <a:fld id="{EA6C8BFA-6DE6-4FA5-862A-F688C711234C}" type="datetime1">
               <a:rPr lang="de-DE" smtClean="0"/>
-              <a:t>17.07.2020</a:t>
+              <a:t>20.07.2020</a:t>
             </a:fld>
             <a:endParaRPr lang="de-DE" dirty="0"/>
           </a:p>
@@ -10646,7 +10613,7 @@
         <p:spPr>
           <a:xfrm>
             <a:off x="5892326" y="1029912"/>
-            <a:ext cx="589873" cy="1463756"/>
+            <a:ext cx="589873" cy="1370279"/>
           </a:xfrm>
           <a:prstGeom prst="flowChartDocument">
             <a:avLst/>
@@ -10699,7 +10666,7 @@
         </p:nvSpPr>
         <p:spPr>
           <a:xfrm>
-            <a:off x="11104961" y="4291034"/>
+            <a:off x="11605771" y="4293534"/>
             <a:ext cx="755009" cy="369332"/>
           </a:xfrm>
           <a:prstGeom prst="rect">
@@ -10720,6 +10687,55 @@
           </a:p>
         </p:txBody>
       </p:sp>
+      <p:cxnSp>
+        <p:nvCxnSpPr>
+          <p:cNvPr id="211" name="Verbinder: gewinkelt 210">
+            <a:extLst>
+              <a:ext uri="{FF2B5EF4-FFF2-40B4-BE49-F238E27FC236}">
+                <a16:creationId xmlns:a16="http://schemas.microsoft.com/office/drawing/2014/main" id="{C5741D17-266F-4CC3-A329-2840FCCCA10E}"/>
+              </a:ext>
+            </a:extLst>
+          </p:cNvPr>
+          <p:cNvCxnSpPr>
+            <a:cxnSpLocks/>
+            <a:stCxn id="105" idx="2"/>
+            <a:endCxn id="50" idx="0"/>
+          </p:cNvCxnSpPr>
+          <p:nvPr/>
+        </p:nvCxnSpPr>
+        <p:spPr>
+          <a:xfrm rot="5400000">
+            <a:off x="7207374" y="4260445"/>
+            <a:ext cx="1258868" cy="707683"/>
+          </a:xfrm>
+          <a:prstGeom prst="bentConnector3">
+            <a:avLst>
+              <a:gd name="adj1" fmla="val 32007"/>
+            </a:avLst>
+          </a:prstGeom>
+          <a:ln>
+            <a:solidFill>
+              <a:schemeClr val="accent6">
+                <a:lumMod val="50000"/>
+              </a:schemeClr>
+            </a:solidFill>
+          </a:ln>
+        </p:spPr>
+        <p:style>
+          <a:lnRef idx="3">
+            <a:schemeClr val="accent6"/>
+          </a:lnRef>
+          <a:fillRef idx="0">
+            <a:schemeClr val="accent6"/>
+          </a:fillRef>
+          <a:effectRef idx="2">
+            <a:schemeClr val="accent6"/>
+          </a:effectRef>
+          <a:fontRef idx="minor">
+            <a:schemeClr val="tx1"/>
+          </a:fontRef>
+        </p:style>
+      </p:cxnSp>
     </p:spTree>
     <p:extLst>
       <p:ext uri="{BB962C8B-B14F-4D97-AF65-F5344CB8AC3E}">

</xml_diff>

<commit_message>
Removed abundand connectors in Schema and fixed typos
</commit_message>
<xml_diff>
--- a/Diagramms/IoT_Concept_Basic_Architecture.pptx
+++ b/Diagramms/IoT_Concept_Basic_Architecture.pptx
@@ -5163,228 +5163,6 @@
             </p:txBody>
           </p:sp>
         </p:grpSp>
-      </p:grpSp>
-      <p:grpSp>
-        <p:nvGrpSpPr>
-          <p:cNvPr id="40" name="Gruppieren 39">
-            <a:extLst>
-              <a:ext uri="{FF2B5EF4-FFF2-40B4-BE49-F238E27FC236}">
-                <a16:creationId xmlns:a16="http://schemas.microsoft.com/office/drawing/2014/main" id="{FB21CFD3-B224-45CC-8AAA-823B69373F6C}"/>
-              </a:ext>
-            </a:extLst>
-          </p:cNvPr>
-          <p:cNvGrpSpPr/>
-          <p:nvPr/>
-        </p:nvGrpSpPr>
-        <p:grpSpPr>
-          <a:xfrm>
-            <a:off x="8871428" y="5249404"/>
-            <a:ext cx="98856" cy="101457"/>
-            <a:chOff x="8086446" y="1200293"/>
-            <a:chExt cx="1033742" cy="1060936"/>
-          </a:xfrm>
-        </p:grpSpPr>
-        <p:sp>
-          <p:nvSpPr>
-            <p:cNvPr id="41" name="Rechteck 40">
-              <a:extLst>
-                <a:ext uri="{FF2B5EF4-FFF2-40B4-BE49-F238E27FC236}">
-                  <a16:creationId xmlns:a16="http://schemas.microsoft.com/office/drawing/2014/main" id="{106B846D-C6AD-4B3F-88E9-85FC720BBD74}"/>
-                </a:ext>
-              </a:extLst>
-            </p:cNvPr>
-            <p:cNvSpPr/>
-            <p:nvPr/>
-          </p:nvSpPr>
-          <p:spPr>
-            <a:xfrm>
-              <a:off x="8086446" y="1200293"/>
-              <a:ext cx="1033742" cy="1060936"/>
-            </a:xfrm>
-            <a:prstGeom prst="rect">
-              <a:avLst/>
-            </a:prstGeom>
-          </p:spPr>
-          <p:style>
-            <a:lnRef idx="1">
-              <a:schemeClr val="dk1"/>
-            </a:lnRef>
-            <a:fillRef idx="2">
-              <a:schemeClr val="dk1"/>
-            </a:fillRef>
-            <a:effectRef idx="1">
-              <a:schemeClr val="dk1"/>
-            </a:effectRef>
-            <a:fontRef idx="minor">
-              <a:schemeClr val="dk1"/>
-            </a:fontRef>
-          </p:style>
-          <p:txBody>
-            <a:bodyPr rtlCol="0" anchor="ctr"/>
-            <a:lstStyle/>
-            <a:p>
-              <a:pPr algn="ctr"/>
-              <a:endParaRPr lang="de-DE"/>
-            </a:p>
-          </p:txBody>
-        </p:sp>
-        <p:sp>
-          <p:nvSpPr>
-            <p:cNvPr id="42" name="Rechteck 41">
-              <a:extLst>
-                <a:ext uri="{FF2B5EF4-FFF2-40B4-BE49-F238E27FC236}">
-                  <a16:creationId xmlns:a16="http://schemas.microsoft.com/office/drawing/2014/main" id="{B1C32234-2161-4D43-95F3-81CD3D26DD7F}"/>
-                </a:ext>
-              </a:extLst>
-            </p:cNvPr>
-            <p:cNvSpPr/>
-            <p:nvPr/>
-          </p:nvSpPr>
-          <p:spPr>
-            <a:xfrm>
-              <a:off x="8163718" y="1905000"/>
-              <a:ext cx="899319" cy="305389"/>
-            </a:xfrm>
-            <a:prstGeom prst="rect">
-              <a:avLst/>
-            </a:prstGeom>
-          </p:spPr>
-          <p:style>
-            <a:lnRef idx="2">
-              <a:schemeClr val="accent3">
-                <a:shade val="50000"/>
-              </a:schemeClr>
-            </a:lnRef>
-            <a:fillRef idx="1">
-              <a:schemeClr val="accent3"/>
-            </a:fillRef>
-            <a:effectRef idx="0">
-              <a:schemeClr val="accent3"/>
-            </a:effectRef>
-            <a:fontRef idx="minor">
-              <a:schemeClr val="lt1"/>
-            </a:fontRef>
-          </p:style>
-          <p:txBody>
-            <a:bodyPr rtlCol="0" anchor="ctr"/>
-            <a:lstStyle/>
-            <a:p>
-              <a:pPr algn="ctr"/>
-              <a:endParaRPr lang="de-DE"/>
-            </a:p>
-          </p:txBody>
-        </p:sp>
-      </p:grpSp>
-      <p:grpSp>
-        <p:nvGrpSpPr>
-          <p:cNvPr id="43" name="Gruppieren 42">
-            <a:extLst>
-              <a:ext uri="{FF2B5EF4-FFF2-40B4-BE49-F238E27FC236}">
-                <a16:creationId xmlns:a16="http://schemas.microsoft.com/office/drawing/2014/main" id="{CA9B7AFB-21D8-42E0-809A-5B4FF02A15A4}"/>
-              </a:ext>
-            </a:extLst>
-          </p:cNvPr>
-          <p:cNvGrpSpPr/>
-          <p:nvPr/>
-        </p:nvGrpSpPr>
-        <p:grpSpPr>
-          <a:xfrm>
-            <a:off x="8709243" y="5249404"/>
-            <a:ext cx="98856" cy="101457"/>
-            <a:chOff x="8086446" y="1200293"/>
-            <a:chExt cx="1033742" cy="1060936"/>
-          </a:xfrm>
-        </p:grpSpPr>
-        <p:sp>
-          <p:nvSpPr>
-            <p:cNvPr id="44" name="Rechteck 43">
-              <a:extLst>
-                <a:ext uri="{FF2B5EF4-FFF2-40B4-BE49-F238E27FC236}">
-                  <a16:creationId xmlns:a16="http://schemas.microsoft.com/office/drawing/2014/main" id="{3F7A8BB5-7ED2-44AD-9165-8E4F32C70B30}"/>
-                </a:ext>
-              </a:extLst>
-            </p:cNvPr>
-            <p:cNvSpPr/>
-            <p:nvPr/>
-          </p:nvSpPr>
-          <p:spPr>
-            <a:xfrm>
-              <a:off x="8086446" y="1200293"/>
-              <a:ext cx="1033742" cy="1060936"/>
-            </a:xfrm>
-            <a:prstGeom prst="rect">
-              <a:avLst/>
-            </a:prstGeom>
-          </p:spPr>
-          <p:style>
-            <a:lnRef idx="1">
-              <a:schemeClr val="dk1"/>
-            </a:lnRef>
-            <a:fillRef idx="2">
-              <a:schemeClr val="dk1"/>
-            </a:fillRef>
-            <a:effectRef idx="1">
-              <a:schemeClr val="dk1"/>
-            </a:effectRef>
-            <a:fontRef idx="minor">
-              <a:schemeClr val="dk1"/>
-            </a:fontRef>
-          </p:style>
-          <p:txBody>
-            <a:bodyPr rtlCol="0" anchor="ctr"/>
-            <a:lstStyle/>
-            <a:p>
-              <a:pPr algn="ctr"/>
-              <a:endParaRPr lang="de-DE"/>
-            </a:p>
-          </p:txBody>
-        </p:sp>
-        <p:sp>
-          <p:nvSpPr>
-            <p:cNvPr id="45" name="Rechteck 44">
-              <a:extLst>
-                <a:ext uri="{FF2B5EF4-FFF2-40B4-BE49-F238E27FC236}">
-                  <a16:creationId xmlns:a16="http://schemas.microsoft.com/office/drawing/2014/main" id="{EB121D99-D184-4658-9CEE-5B835DF5B965}"/>
-                </a:ext>
-              </a:extLst>
-            </p:cNvPr>
-            <p:cNvSpPr/>
-            <p:nvPr/>
-          </p:nvSpPr>
-          <p:spPr>
-            <a:xfrm>
-              <a:off x="8163718" y="1905000"/>
-              <a:ext cx="899319" cy="305389"/>
-            </a:xfrm>
-            <a:prstGeom prst="rect">
-              <a:avLst/>
-            </a:prstGeom>
-          </p:spPr>
-          <p:style>
-            <a:lnRef idx="2">
-              <a:schemeClr val="accent3">
-                <a:shade val="50000"/>
-              </a:schemeClr>
-            </a:lnRef>
-            <a:fillRef idx="1">
-              <a:schemeClr val="accent3"/>
-            </a:fillRef>
-            <a:effectRef idx="0">
-              <a:schemeClr val="accent3"/>
-            </a:effectRef>
-            <a:fontRef idx="minor">
-              <a:schemeClr val="lt1"/>
-            </a:fontRef>
-          </p:style>
-          <p:txBody>
-            <a:bodyPr rtlCol="0" anchor="ctr"/>
-            <a:lstStyle/>
-            <a:p>
-              <a:pPr algn="ctr"/>
-              <a:endParaRPr lang="de-DE"/>
-            </a:p>
-          </p:txBody>
-        </p:sp>
       </p:grpSp>
       <p:grpSp>
         <p:nvGrpSpPr>
@@ -9620,8 +9398,8 @@
         </p:nvSpPr>
         <p:spPr>
           <a:xfrm>
-            <a:off x="9199153" y="3503034"/>
-            <a:ext cx="694880" cy="1642603"/>
+            <a:off x="9199153" y="3503035"/>
+            <a:ext cx="694880" cy="1127802"/>
           </a:xfrm>
           <a:prstGeom prst="rect">
             <a:avLst/>
@@ -9649,30 +9427,30 @@
           <a:p>
             <a:pPr algn="ctr"/>
             <a:r>
-              <a:rPr lang="de-DE" sz="1100" dirty="0"/>
+              <a:rPr lang="de-DE" sz="1000" dirty="0"/>
               <a:t>Other BUS-</a:t>
             </a:r>
             <a:r>
-              <a:rPr lang="de-DE" sz="1100" dirty="0" err="1"/>
+              <a:rPr lang="de-DE" sz="1000" dirty="0" err="1"/>
               <a:t>Actuators</a:t>
             </a:r>
             <a:r>
-              <a:rPr lang="de-DE" sz="1100" dirty="0"/>
+              <a:rPr lang="de-DE" sz="1000" dirty="0"/>
               <a:t> </a:t>
             </a:r>
           </a:p>
           <a:p>
             <a:pPr algn="ctr"/>
             <a:r>
-              <a:rPr lang="de-DE" sz="1100" dirty="0"/>
+              <a:rPr lang="de-DE" sz="1000" dirty="0"/>
               <a:t>e.g. FC, </a:t>
             </a:r>
             <a:r>
-              <a:rPr lang="de-DE" sz="1100" dirty="0" err="1"/>
+              <a:rPr lang="de-DE" sz="1000" dirty="0" err="1"/>
               <a:t>Valves</a:t>
             </a:r>
             <a:r>
-              <a:rPr lang="de-DE" sz="1100" dirty="0"/>
+              <a:rPr lang="de-DE" sz="1000" dirty="0"/>
               <a:t>, …</a:t>
             </a:r>
           </a:p>
@@ -9692,7 +9470,7 @@
         </p:nvGrpSpPr>
         <p:grpSpPr>
           <a:xfrm>
-            <a:off x="9709737" y="4978222"/>
+            <a:off x="9230485" y="4483987"/>
             <a:ext cx="98856" cy="101457"/>
             <a:chOff x="7759300" y="5980076"/>
             <a:chExt cx="98856" cy="101457"/>
@@ -9807,12 +9585,12 @@
         </p:nvCxnSpPr>
         <p:spPr>
           <a:xfrm rot="5400000" flipH="1" flipV="1">
-            <a:off x="8533030" y="4875430"/>
-            <a:ext cx="1027885" cy="1424810"/>
+            <a:off x="8046287" y="4867938"/>
+            <a:ext cx="1522120" cy="945558"/>
           </a:xfrm>
           <a:prstGeom prst="bentConnector3">
             <a:avLst>
-              <a:gd name="adj1" fmla="val -22240"/>
+              <a:gd name="adj1" fmla="val -15019"/>
             </a:avLst>
           </a:prstGeom>
         </p:spPr>
@@ -9881,7 +9659,7 @@
         </p:nvSpPr>
         <p:spPr>
           <a:xfrm>
-            <a:off x="9516205" y="5158377"/>
+            <a:off x="9029679" y="4664026"/>
             <a:ext cx="292388" cy="390492"/>
           </a:xfrm>
           <a:prstGeom prst="rect">

</xml_diff>

<commit_message>
Added external control systems to schema and fixed typos
</commit_message>
<xml_diff>
--- a/Diagramms/IoT_Concept_Basic_Architecture.pptx
+++ b/Diagramms/IoT_Concept_Basic_Architecture.pptx
@@ -197,7 +197,7 @@
           <a:p>
             <a:fld id="{98E5A0E9-E8EB-4B2F-B9FE-EA71FB6CA681}" type="datetimeFigureOut">
               <a:rPr lang="de-DE" smtClean="0"/>
-              <a:t>20.07.2020</a:t>
+              <a:t>21.07.2020</a:t>
             </a:fld>
             <a:endParaRPr lang="de-DE"/>
           </a:p>
@@ -611,7 +611,7 @@
           <a:p>
             <a:fld id="{B2781510-CB02-4453-BCA8-C07E5FD3A014}" type="datetimeFigureOut">
               <a:rPr lang="de-DE" smtClean="0"/>
-              <a:t>20.07.2020</a:t>
+              <a:t>21.07.2020</a:t>
             </a:fld>
             <a:endParaRPr lang="de-DE"/>
           </a:p>
@@ -809,7 +809,7 @@
           <a:p>
             <a:fld id="{B2781510-CB02-4453-BCA8-C07E5FD3A014}" type="datetimeFigureOut">
               <a:rPr lang="de-DE" smtClean="0"/>
-              <a:t>20.07.2020</a:t>
+              <a:t>21.07.2020</a:t>
             </a:fld>
             <a:endParaRPr lang="de-DE"/>
           </a:p>
@@ -1017,7 +1017,7 @@
           <a:p>
             <a:fld id="{B2781510-CB02-4453-BCA8-C07E5FD3A014}" type="datetimeFigureOut">
               <a:rPr lang="de-DE" smtClean="0"/>
-              <a:t>20.07.2020</a:t>
+              <a:t>21.07.2020</a:t>
             </a:fld>
             <a:endParaRPr lang="de-DE"/>
           </a:p>
@@ -1215,7 +1215,7 @@
           <a:p>
             <a:fld id="{B2781510-CB02-4453-BCA8-C07E5FD3A014}" type="datetimeFigureOut">
               <a:rPr lang="de-DE" smtClean="0"/>
-              <a:t>20.07.2020</a:t>
+              <a:t>21.07.2020</a:t>
             </a:fld>
             <a:endParaRPr lang="de-DE"/>
           </a:p>
@@ -1490,7 +1490,7 @@
           <a:p>
             <a:fld id="{B2781510-CB02-4453-BCA8-C07E5FD3A014}" type="datetimeFigureOut">
               <a:rPr lang="de-DE" smtClean="0"/>
-              <a:t>20.07.2020</a:t>
+              <a:t>21.07.2020</a:t>
             </a:fld>
             <a:endParaRPr lang="de-DE"/>
           </a:p>
@@ -1755,7 +1755,7 @@
           <a:p>
             <a:fld id="{B2781510-CB02-4453-BCA8-C07E5FD3A014}" type="datetimeFigureOut">
               <a:rPr lang="de-DE" smtClean="0"/>
-              <a:t>20.07.2020</a:t>
+              <a:t>21.07.2020</a:t>
             </a:fld>
             <a:endParaRPr lang="de-DE"/>
           </a:p>
@@ -2167,7 +2167,7 @@
           <a:p>
             <a:fld id="{B2781510-CB02-4453-BCA8-C07E5FD3A014}" type="datetimeFigureOut">
               <a:rPr lang="de-DE" smtClean="0"/>
-              <a:t>20.07.2020</a:t>
+              <a:t>21.07.2020</a:t>
             </a:fld>
             <a:endParaRPr lang="de-DE"/>
           </a:p>
@@ -2308,7 +2308,7 @@
           <a:p>
             <a:fld id="{B2781510-CB02-4453-BCA8-C07E5FD3A014}" type="datetimeFigureOut">
               <a:rPr lang="de-DE" smtClean="0"/>
-              <a:t>20.07.2020</a:t>
+              <a:t>21.07.2020</a:t>
             </a:fld>
             <a:endParaRPr lang="de-DE"/>
           </a:p>
@@ -2421,7 +2421,7 @@
           <a:p>
             <a:fld id="{B2781510-CB02-4453-BCA8-C07E5FD3A014}" type="datetimeFigureOut">
               <a:rPr lang="de-DE" smtClean="0"/>
-              <a:t>20.07.2020</a:t>
+              <a:t>21.07.2020</a:t>
             </a:fld>
             <a:endParaRPr lang="de-DE"/>
           </a:p>
@@ -2732,7 +2732,7 @@
           <a:p>
             <a:fld id="{B2781510-CB02-4453-BCA8-C07E5FD3A014}" type="datetimeFigureOut">
               <a:rPr lang="de-DE" smtClean="0"/>
-              <a:t>20.07.2020</a:t>
+              <a:t>21.07.2020</a:t>
             </a:fld>
             <a:endParaRPr lang="de-DE"/>
           </a:p>
@@ -3020,7 +3020,7 @@
           <a:p>
             <a:fld id="{B2781510-CB02-4453-BCA8-C07E5FD3A014}" type="datetimeFigureOut">
               <a:rPr lang="de-DE" smtClean="0"/>
-              <a:t>20.07.2020</a:t>
+              <a:t>21.07.2020</a:t>
             </a:fld>
             <a:endParaRPr lang="de-DE"/>
           </a:p>
@@ -3261,7 +3261,7 @@
           <a:p>
             <a:fld id="{B2781510-CB02-4453-BCA8-C07E5FD3A014}" type="datetimeFigureOut">
               <a:rPr lang="de-DE" smtClean="0"/>
-              <a:t>20.07.2020</a:t>
+              <a:t>21.07.2020</a:t>
             </a:fld>
             <a:endParaRPr lang="de-DE"/>
           </a:p>
@@ -4177,7 +4177,7 @@
         </p:nvSpPr>
         <p:spPr>
           <a:xfrm>
-            <a:off x="1543050" y="694026"/>
+            <a:off x="1563528" y="694026"/>
             <a:ext cx="7195951" cy="4295381"/>
           </a:xfrm>
           <a:prstGeom prst="roundRect">
@@ -4206,6 +4206,7 @@
           <a:bodyPr rtlCol="0" anchor="b"/>
           <a:lstStyle/>
           <a:p>
+            <a:pPr algn="ctr"/>
             <a:r>
               <a:rPr lang="de-DE" sz="1200" dirty="0"/>
               <a:t>Hypervisor Type 1 </a:t>
@@ -4216,7 +4217,15 @@
             </a:r>
             <a:r>
               <a:rPr lang="de-DE" sz="1200" dirty="0"/>
-              <a:t> 2 e.g. Linux KVM </a:t>
+              <a:t> 2 e.g. Linux </a:t>
+            </a:r>
+            <a:r>
+              <a:rPr lang="de-DE" sz="1200" dirty="0" err="1"/>
+              <a:t>with</a:t>
+            </a:r>
+            <a:r>
+              <a:rPr lang="de-DE" sz="1200" dirty="0"/>
+              <a:t> KVM </a:t>
             </a:r>
             <a:r>
               <a:rPr lang="de-DE" sz="1200" dirty="0" err="1"/>
@@ -4232,7 +4241,15 @@
             </a:r>
             <a:r>
               <a:rPr lang="de-DE" sz="1200" dirty="0"/>
-              <a:t> native Container Support</a:t>
+              <a:t> native Container Support                            </a:t>
+            </a:r>
+            <a:r>
+              <a:rPr lang="de-DE" sz="1200" dirty="0">
+                <a:solidFill>
+                  <a:srgbClr val="00B050"/>
+                </a:solidFill>
+              </a:rPr>
+              <a:t>.</a:t>
             </a:r>
           </a:p>
         </p:txBody>
@@ -5015,15 +5032,15 @@
             <a:p>
               <a:pPr algn="ctr"/>
               <a:r>
-                <a:rPr lang="de-DE" dirty="0"/>
+                <a:rPr lang="de-DE" sz="1600" dirty="0"/>
                 <a:t>NAS </a:t>
               </a:r>
               <a:r>
-                <a:rPr lang="de-DE" dirty="0" err="1"/>
+                <a:rPr lang="de-DE" sz="1600" dirty="0" err="1"/>
                 <a:t>or</a:t>
               </a:r>
               <a:r>
-                <a:rPr lang="de-DE" dirty="0"/>
+                <a:rPr lang="de-DE" sz="1600" dirty="0"/>
                 <a:t> USB-Storage</a:t>
               </a:r>
             </a:p>
@@ -5819,7 +5836,8 @@
           <a:ln>
             <a:solidFill>
               <a:schemeClr val="accent6">
-                <a:lumMod val="50000"/>
+                <a:lumMod val="40000"/>
+                <a:lumOff val="60000"/>
               </a:schemeClr>
             </a:solidFill>
           </a:ln>
@@ -5865,7 +5883,8 @@
           <a:ln>
             <a:solidFill>
               <a:schemeClr val="accent6">
-                <a:lumMod val="50000"/>
+                <a:lumMod val="40000"/>
+                <a:lumOff val="60000"/>
               </a:schemeClr>
             </a:solidFill>
           </a:ln>
@@ -5910,7 +5929,8 @@
           <a:ln>
             <a:solidFill>
               <a:schemeClr val="accent6">
-                <a:lumMod val="50000"/>
+                <a:lumMod val="40000"/>
+                <a:lumOff val="60000"/>
               </a:schemeClr>
             </a:solidFill>
           </a:ln>
@@ -5955,7 +5975,8 @@
           <a:ln>
             <a:solidFill>
               <a:schemeClr val="accent6">
-                <a:lumMod val="50000"/>
+                <a:lumMod val="40000"/>
+                <a:lumOff val="60000"/>
               </a:schemeClr>
             </a:solidFill>
           </a:ln>
@@ -6109,6 +6130,14 @@
           <a:prstGeom prst="bentConnector2">
             <a:avLst/>
           </a:prstGeom>
+          <a:ln>
+            <a:solidFill>
+              <a:schemeClr val="accent4">
+                <a:lumMod val="40000"/>
+                <a:lumOff val="60000"/>
+              </a:schemeClr>
+            </a:solidFill>
+          </a:ln>
         </p:spPr>
         <p:style>
           <a:lnRef idx="3">
@@ -6147,6 +6176,14 @@
           <a:prstGeom prst="line">
             <a:avLst/>
           </a:prstGeom>
+          <a:ln>
+            <a:solidFill>
+              <a:schemeClr val="accent4">
+                <a:lumMod val="40000"/>
+                <a:lumOff val="60000"/>
+              </a:schemeClr>
+            </a:solidFill>
+          </a:ln>
         </p:spPr>
         <p:style>
           <a:lnRef idx="3">
@@ -6188,7 +6225,8 @@
           <a:ln>
             <a:solidFill>
               <a:schemeClr val="accent6">
-                <a:lumMod val="50000"/>
+                <a:lumMod val="40000"/>
+                <a:lumOff val="60000"/>
               </a:schemeClr>
             </a:solidFill>
           </a:ln>
@@ -6345,7 +6383,8 @@
           <a:ln>
             <a:solidFill>
               <a:schemeClr val="accent6">
-                <a:lumMod val="50000"/>
+                <a:lumMod val="40000"/>
+                <a:lumOff val="60000"/>
               </a:schemeClr>
             </a:solidFill>
           </a:ln>
@@ -6394,7 +6433,8 @@
           <a:ln>
             <a:solidFill>
               <a:schemeClr val="accent6">
-                <a:lumMod val="50000"/>
+                <a:lumMod val="40000"/>
+                <a:lumOff val="60000"/>
               </a:schemeClr>
             </a:solidFill>
           </a:ln>
@@ -6426,24 +6466,25 @@
           <p:cNvCxnSpPr>
             <a:cxnSpLocks/>
             <a:stCxn id="39" idx="2"/>
-            <a:endCxn id="51" idx="2"/>
+            <a:endCxn id="156" idx="2"/>
           </p:cNvCxnSpPr>
           <p:nvPr/>
         </p:nvCxnSpPr>
         <p:spPr>
-          <a:xfrm rot="5400000" flipH="1" flipV="1">
-            <a:off x="5817001" y="4429438"/>
-            <a:ext cx="756050" cy="2577803"/>
+          <a:xfrm rot="16200000" flipH="1">
+            <a:off x="6676387" y="4326102"/>
+            <a:ext cx="31703" cy="3572227"/>
           </a:xfrm>
           <a:prstGeom prst="bentConnector3">
             <a:avLst>
-              <a:gd name="adj1" fmla="val -54647"/>
+              <a:gd name="adj1" fmla="val 1702372"/>
             </a:avLst>
           </a:prstGeom>
           <a:ln>
             <a:solidFill>
               <a:schemeClr val="accent6">
-                <a:lumMod val="50000"/>
+                <a:lumMod val="40000"/>
+                <a:lumOff val="60000"/>
               </a:schemeClr>
             </a:solidFill>
           </a:ln>
@@ -6506,97 +6547,109 @@
           <a:p>
             <a:pPr algn="ctr"/>
             <a:r>
-              <a:rPr lang="de-DE" sz="1200" dirty="0"/>
+              <a:rPr lang="de-DE" sz="1050" dirty="0"/>
               <a:t>Acts </a:t>
             </a:r>
             <a:r>
-              <a:rPr lang="de-DE" sz="1200" dirty="0" err="1"/>
+              <a:rPr lang="de-DE" sz="1050" dirty="0" err="1"/>
               <a:t>as</a:t>
             </a:r>
             <a:r>
-              <a:rPr lang="de-DE" sz="1200" dirty="0"/>
+              <a:rPr lang="de-DE" sz="1050" dirty="0"/>
               <a:t> </a:t>
             </a:r>
             <a:r>
-              <a:rPr lang="de-DE" sz="1200" dirty="0" err="1"/>
+              <a:rPr lang="de-DE" sz="1050" dirty="0" err="1"/>
               <a:t>gate</a:t>
             </a:r>
             <a:r>
-              <a:rPr lang="de-DE" sz="1200" dirty="0"/>
+              <a:rPr lang="de-DE" sz="1050" dirty="0"/>
               <a:t> </a:t>
             </a:r>
             <a:r>
-              <a:rPr lang="de-DE" sz="1200" dirty="0" err="1"/>
+              <a:rPr lang="de-DE" sz="1050" dirty="0" err="1"/>
               <a:t>keeper</a:t>
             </a:r>
             <a:r>
-              <a:rPr lang="de-DE" sz="1200" dirty="0"/>
+              <a:rPr lang="de-DE" sz="1050" dirty="0"/>
               <a:t>, </a:t>
             </a:r>
             <a:r>
-              <a:rPr lang="de-DE" sz="1200" dirty="0" err="1"/>
+              <a:rPr lang="de-DE" sz="1050" dirty="0" err="1"/>
               <a:t>firewall</a:t>
             </a:r>
             <a:r>
-              <a:rPr lang="de-DE" sz="1200" dirty="0"/>
+              <a:rPr lang="de-DE" sz="1050" dirty="0"/>
               <a:t> and </a:t>
             </a:r>
             <a:r>
-              <a:rPr lang="de-DE" sz="1200" dirty="0" err="1"/>
+              <a:rPr lang="de-DE" sz="1050" dirty="0" err="1"/>
               <a:t>security</a:t>
             </a:r>
             <a:r>
-              <a:rPr lang="de-DE" sz="1200" dirty="0"/>
+              <a:rPr lang="de-DE" sz="1050" dirty="0"/>
               <a:t> </a:t>
             </a:r>
             <a:r>
-              <a:rPr lang="de-DE" sz="1200" dirty="0" err="1"/>
+              <a:rPr lang="de-DE" sz="1050" dirty="0" err="1"/>
               <a:t>instance</a:t>
             </a:r>
             <a:r>
-              <a:rPr lang="de-DE" sz="1200" dirty="0"/>
+              <a:rPr lang="de-DE" sz="1050" dirty="0"/>
               <a:t>. </a:t>
             </a:r>
             <a:r>
-              <a:rPr lang="de-DE" sz="1200" dirty="0" err="1"/>
+              <a:rPr lang="de-DE" sz="1050" dirty="0" err="1"/>
               <a:t>Performs</a:t>
             </a:r>
             <a:r>
-              <a:rPr lang="de-DE" sz="1200" dirty="0"/>
+              <a:rPr lang="de-DE" sz="1050" dirty="0"/>
               <a:t> </a:t>
             </a:r>
             <a:r>
-              <a:rPr lang="de-DE" sz="1200" dirty="0" err="1"/>
+              <a:rPr lang="de-DE" sz="1050" dirty="0" err="1"/>
               <a:t>authentication</a:t>
             </a:r>
             <a:r>
-              <a:rPr lang="de-DE" sz="1200" dirty="0"/>
+              <a:rPr lang="de-DE" sz="1050" dirty="0"/>
               <a:t>- and </a:t>
             </a:r>
             <a:r>
-              <a:rPr lang="de-DE" sz="1200" dirty="0" err="1"/>
+              <a:rPr lang="de-DE" sz="1050" dirty="0" err="1"/>
               <a:t>authorization</a:t>
             </a:r>
             <a:r>
-              <a:rPr lang="de-DE" sz="1200" dirty="0"/>
+              <a:rPr lang="de-DE" sz="1050" dirty="0"/>
               <a:t> </a:t>
             </a:r>
             <a:r>
-              <a:rPr lang="de-DE" sz="1200" dirty="0" err="1"/>
+              <a:rPr lang="de-DE" sz="1050" dirty="0" err="1"/>
               <a:t>checking</a:t>
             </a:r>
             <a:r>
-              <a:rPr lang="de-DE" sz="1200" dirty="0"/>
+              <a:rPr lang="de-DE" sz="1050" dirty="0"/>
               <a:t> and </a:t>
             </a:r>
             <a:r>
-              <a:rPr lang="de-DE" sz="1200" dirty="0" err="1"/>
+              <a:rPr lang="de-DE" sz="1050" dirty="0" err="1"/>
               <a:t>granting</a:t>
             </a:r>
             <a:r>
-              <a:rPr lang="de-DE" sz="1200" dirty="0"/>
+              <a:rPr lang="de-DE" sz="1050" dirty="0"/>
               <a:t>.</a:t>
             </a:r>
+          </a:p>
+          <a:p>
+            <a:pPr algn="ctr"/>
+            <a:endParaRPr lang="de-DE" sz="1200" dirty="0"/>
+          </a:p>
+          <a:p>
+            <a:pPr algn="ctr"/>
+            <a:endParaRPr lang="de-DE" sz="1200" dirty="0"/>
+          </a:p>
+          <a:p>
+            <a:pPr algn="ctr"/>
+            <a:endParaRPr lang="de-DE" sz="1200" dirty="0"/>
           </a:p>
           <a:p>
             <a:pPr algn="ctr"/>
@@ -6882,6 +6935,14 @@
               <a:gd name="adj1" fmla="val 1934383"/>
             </a:avLst>
           </a:prstGeom>
+          <a:ln>
+            <a:solidFill>
+              <a:schemeClr val="accent4">
+                <a:lumMod val="40000"/>
+                <a:lumOff val="60000"/>
+              </a:schemeClr>
+            </a:solidFill>
+          </a:ln>
         </p:spPr>
         <p:style>
           <a:lnRef idx="3">
@@ -7038,7 +7099,7 @@
           </a:xfrm>
           <a:prstGeom prst="bentConnector3">
             <a:avLst>
-              <a:gd name="adj1" fmla="val 177948"/>
+              <a:gd name="adj1" fmla="val 188027"/>
             </a:avLst>
           </a:prstGeom>
         </p:spPr>
@@ -7882,7 +7943,7 @@
         </p:nvSpPr>
         <p:spPr>
           <a:xfrm>
-            <a:off x="5080444" y="2598749"/>
+            <a:off x="5060371" y="2580902"/>
             <a:ext cx="292388" cy="278281"/>
           </a:xfrm>
           <a:prstGeom prst="rect">
@@ -7917,7 +7978,7 @@
         </p:nvSpPr>
         <p:spPr>
           <a:xfrm>
-            <a:off x="4068686" y="2599168"/>
+            <a:off x="4048613" y="2580902"/>
             <a:ext cx="292388" cy="281487"/>
           </a:xfrm>
           <a:prstGeom prst="rect">
@@ -8022,7 +8083,7 @@
         </p:nvSpPr>
         <p:spPr>
           <a:xfrm>
-            <a:off x="4912920" y="6114321"/>
+            <a:off x="4583379" y="6140579"/>
             <a:ext cx="292388" cy="387286"/>
           </a:xfrm>
           <a:prstGeom prst="rect">
@@ -8129,8 +8190,8 @@
         </p:nvSpPr>
         <p:spPr>
           <a:xfrm>
-            <a:off x="4683468" y="2884102"/>
-            <a:ext cx="1313180" cy="200055"/>
+            <a:off x="4703612" y="2909646"/>
+            <a:ext cx="1895071" cy="200055"/>
           </a:xfrm>
           <a:prstGeom prst="rect">
             <a:avLst/>
@@ -8145,7 +8206,15 @@
           <a:p>
             <a:r>
               <a:rPr lang="de-DE" sz="700" i="1" dirty="0"/>
-              <a:t>(Modbus </a:t>
+              <a:t>(Modbus and/</a:t>
+            </a:r>
+            <a:r>
+              <a:rPr lang="de-DE" sz="700" i="1" dirty="0" err="1"/>
+              <a:t>or</a:t>
+            </a:r>
+            <a:r>
+              <a:rPr lang="de-DE" sz="700" i="1" dirty="0"/>
+              <a:t> OPC-UA </a:t>
             </a:r>
             <a:r>
               <a:rPr lang="de-DE" sz="700" i="1" dirty="0" err="1"/>
@@ -8153,7 +8222,15 @@
             </a:r>
             <a:r>
               <a:rPr lang="de-DE" sz="700" i="1" dirty="0"/>
-              <a:t> Backup </a:t>
+              <a:t> </a:t>
+            </a:r>
+            <a:r>
+              <a:rPr lang="de-DE" sz="700" i="1" dirty="0" err="1"/>
+              <a:t>backup</a:t>
+            </a:r>
+            <a:r>
+              <a:rPr lang="de-DE" sz="700" i="1" dirty="0"/>
+              <a:t> </a:t>
             </a:r>
             <a:r>
               <a:rPr lang="de-DE" sz="700" i="1" dirty="0" err="1"/>
@@ -8230,7 +8307,7 @@
             <a:p>
               <a:pPr algn="ctr"/>
               <a:r>
-                <a:rPr lang="de-DE" dirty="0"/>
+                <a:rPr lang="de-DE" sz="1600" dirty="0"/>
                 <a:t>Router</a:t>
               </a:r>
             </a:p>
@@ -8517,7 +8594,7 @@
           </a:xfrm>
           <a:prstGeom prst="bentConnector3">
             <a:avLst>
-              <a:gd name="adj1" fmla="val 371511"/>
+              <a:gd name="adj1" fmla="val 415624"/>
             </a:avLst>
           </a:prstGeom>
         </p:spPr>
@@ -8585,7 +8662,7 @@
         </p:nvSpPr>
         <p:spPr>
           <a:xfrm>
-            <a:off x="4377274" y="2554300"/>
+            <a:off x="4356825" y="2575281"/>
             <a:ext cx="292388" cy="380873"/>
           </a:xfrm>
           <a:prstGeom prst="rect">
@@ -8620,7 +8697,7 @@
         </p:nvSpPr>
         <p:spPr>
           <a:xfrm>
-            <a:off x="3733768" y="2575097"/>
+            <a:off x="3713695" y="2580902"/>
             <a:ext cx="292388" cy="315151"/>
           </a:xfrm>
           <a:prstGeom prst="rect">
@@ -9353,19 +9430,19 @@
           </p:cNvPr>
           <p:cNvCxnSpPr>
             <a:cxnSpLocks/>
-            <a:stCxn id="174" idx="2"/>
+            <a:stCxn id="165" idx="2"/>
             <a:endCxn id="23" idx="2"/>
           </p:cNvCxnSpPr>
           <p:nvPr/>
         </p:nvCxnSpPr>
         <p:spPr>
           <a:xfrm rot="5400000" flipH="1" flipV="1">
-            <a:off x="8401082" y="4380315"/>
-            <a:ext cx="1520265" cy="1935385"/>
+            <a:off x="8617066" y="4596299"/>
+            <a:ext cx="1520265" cy="1503418"/>
           </a:xfrm>
           <a:prstGeom prst="bentConnector3">
             <a:avLst>
-              <a:gd name="adj1" fmla="val -26625"/>
+              <a:gd name="adj1" fmla="val -19632"/>
             </a:avLst>
           </a:prstGeom>
         </p:spPr>
@@ -9578,19 +9655,19 @@
           </p:cNvPr>
           <p:cNvCxnSpPr>
             <a:cxnSpLocks/>
-            <a:stCxn id="173" idx="2"/>
+            <a:stCxn id="164" idx="2"/>
             <a:endCxn id="190" idx="2"/>
           </p:cNvCxnSpPr>
           <p:nvPr/>
         </p:nvCxnSpPr>
         <p:spPr>
           <a:xfrm rot="5400000" flipH="1" flipV="1">
-            <a:off x="8046287" y="4867938"/>
-            <a:ext cx="1522120" cy="945558"/>
+            <a:off x="8267467" y="5090620"/>
+            <a:ext cx="1523621" cy="501696"/>
           </a:xfrm>
           <a:prstGeom prst="bentConnector3">
             <a:avLst>
-              <a:gd name="adj1" fmla="val -15019"/>
+              <a:gd name="adj1" fmla="val -14587"/>
             </a:avLst>
           </a:prstGeom>
         </p:spPr>
@@ -9611,42 +9688,6 @@
       </p:cxnSp>
       <p:sp>
         <p:nvSpPr>
-          <p:cNvPr id="196" name="Textfeld 195">
-            <a:extLst>
-              <a:ext uri="{FF2B5EF4-FFF2-40B4-BE49-F238E27FC236}">
-                <a16:creationId xmlns:a16="http://schemas.microsoft.com/office/drawing/2014/main" id="{AC9BDFCA-A0D9-4E7C-859F-698EAA218186}"/>
-              </a:ext>
-            </a:extLst>
-          </p:cNvPr>
-          <p:cNvSpPr txBox="1"/>
-          <p:nvPr/>
-        </p:nvSpPr>
-        <p:spPr>
-          <a:xfrm>
-            <a:off x="7965641" y="6529401"/>
-            <a:ext cx="482824" cy="200055"/>
-          </a:xfrm>
-          <a:prstGeom prst="rect">
-            <a:avLst/>
-          </a:prstGeom>
-          <a:noFill/>
-        </p:spPr>
-        <p:txBody>
-          <a:bodyPr vert="horz" wrap="none" rtlCol="0">
-            <a:spAutoFit/>
-          </a:bodyPr>
-          <a:lstStyle/>
-          <a:p>
-            <a:r>
-              <a:rPr lang="de-DE" sz="700" i="1" dirty="0"/>
-              <a:t>Modbus</a:t>
-            </a:r>
-            <a:endParaRPr lang="de-DE" sz="1000" i="1" dirty="0"/>
-          </a:p>
-        </p:txBody>
-      </p:sp>
-      <p:sp>
-        <p:nvSpPr>
           <p:cNvPr id="197" name="Textfeld 196">
             <a:extLst>
               <a:ext uri="{FF2B5EF4-FFF2-40B4-BE49-F238E27FC236}">
@@ -9740,7 +9781,7 @@
           <a:p>
             <a:fld id="{EA6C8BFA-6DE6-4FA5-862A-F688C711234C}" type="datetime1">
               <a:rPr lang="de-DE" smtClean="0"/>
-              <a:t>20.07.2020</a:t>
+              <a:t>21.07.2020</a:t>
             </a:fld>
             <a:endParaRPr lang="de-DE" dirty="0"/>
           </a:p>
@@ -9773,6 +9814,14 @@
               <a:gd name="adj2" fmla="val 108408"/>
             </a:avLst>
           </a:prstGeom>
+          <a:ln>
+            <a:solidFill>
+              <a:schemeClr val="accent4">
+                <a:lumMod val="40000"/>
+                <a:lumOff val="60000"/>
+              </a:schemeClr>
+            </a:solidFill>
+          </a:ln>
         </p:spPr>
         <p:style>
           <a:lnRef idx="3">
@@ -9833,7 +9882,7 @@
             </a:prstGeom>
             <a:solidFill>
               <a:schemeClr val="accent4">
-                <a:alpha val="30000"/>
+                <a:alpha val="16000"/>
               </a:schemeClr>
             </a:solidFill>
             <a:ln>
@@ -10023,7 +10072,8 @@
                   <a:ln>
                     <a:solidFill>
                       <a:schemeClr val="accent6">
-                        <a:lumMod val="50000"/>
+                        <a:lumMod val="40000"/>
+                        <a:lumOff val="60000"/>
                       </a:schemeClr>
                     </a:solidFill>
                   </a:ln>
@@ -10101,16 +10151,24 @@
                   <a:prstGeom prst="line">
                     <a:avLst/>
                   </a:prstGeom>
+                  <a:ln>
+                    <a:solidFill>
+                      <a:schemeClr val="accent4">
+                        <a:lumMod val="40000"/>
+                        <a:lumOff val="60000"/>
+                      </a:schemeClr>
+                    </a:solidFill>
+                  </a:ln>
                 </p:spPr>
                 <p:style>
                   <a:lnRef idx="3">
-                    <a:schemeClr val="accent5"/>
+                    <a:schemeClr val="accent4"/>
                   </a:lnRef>
                   <a:fillRef idx="0">
-                    <a:schemeClr val="accent5"/>
+                    <a:schemeClr val="accent4"/>
                   </a:fillRef>
                   <a:effectRef idx="2">
-                    <a:schemeClr val="accent5"/>
+                    <a:schemeClr val="accent4"/>
                   </a:effectRef>
                   <a:fontRef idx="minor">
                     <a:schemeClr val="tx1"/>
@@ -10494,7 +10552,8 @@
           <a:ln>
             <a:solidFill>
               <a:schemeClr val="accent6">
-                <a:lumMod val="50000"/>
+                <a:lumMod val="40000"/>
+                <a:lumOff val="60000"/>
               </a:schemeClr>
             </a:solidFill>
           </a:ln>
@@ -10514,6 +10573,323 @@
           </a:fontRef>
         </p:style>
       </p:cxnSp>
+      <p:grpSp>
+        <p:nvGrpSpPr>
+          <p:cNvPr id="18" name="Gruppieren 17">
+            <a:extLst>
+              <a:ext uri="{FF2B5EF4-FFF2-40B4-BE49-F238E27FC236}">
+                <a16:creationId xmlns:a16="http://schemas.microsoft.com/office/drawing/2014/main" id="{1283C41C-91C7-46A3-AA93-41C551489664}"/>
+              </a:ext>
+            </a:extLst>
+          </p:cNvPr>
+          <p:cNvGrpSpPr/>
+          <p:nvPr/>
+        </p:nvGrpSpPr>
+        <p:grpSpPr>
+          <a:xfrm>
+            <a:off x="5132665" y="5634383"/>
+            <a:ext cx="2002838" cy="486560"/>
+            <a:chOff x="5132665" y="5634383"/>
+            <a:chExt cx="2002838" cy="486560"/>
+          </a:xfrm>
+        </p:grpSpPr>
+        <p:sp>
+          <p:nvSpPr>
+            <p:cNvPr id="212" name="Rechteck 211">
+              <a:extLst>
+                <a:ext uri="{FF2B5EF4-FFF2-40B4-BE49-F238E27FC236}">
+                  <a16:creationId xmlns:a16="http://schemas.microsoft.com/office/drawing/2014/main" id="{3DE380E8-3305-47AD-9CB6-A29F7EF745E8}"/>
+                </a:ext>
+              </a:extLst>
+            </p:cNvPr>
+            <p:cNvSpPr/>
+            <p:nvPr/>
+          </p:nvSpPr>
+          <p:spPr>
+            <a:xfrm>
+              <a:off x="5132665" y="5634383"/>
+              <a:ext cx="2002838" cy="486560"/>
+            </a:xfrm>
+            <a:prstGeom prst="rect">
+              <a:avLst/>
+            </a:prstGeom>
+          </p:spPr>
+          <p:style>
+            <a:lnRef idx="2">
+              <a:schemeClr val="accent3">
+                <a:shade val="50000"/>
+              </a:schemeClr>
+            </a:lnRef>
+            <a:fillRef idx="1">
+              <a:schemeClr val="accent3"/>
+            </a:fillRef>
+            <a:effectRef idx="0">
+              <a:schemeClr val="accent3"/>
+            </a:effectRef>
+            <a:fontRef idx="minor">
+              <a:schemeClr val="lt1"/>
+            </a:fontRef>
+          </p:style>
+          <p:txBody>
+            <a:bodyPr rtlCol="0" anchor="ctr"/>
+            <a:lstStyle/>
+            <a:p>
+              <a:pPr algn="ctr"/>
+              <a:r>
+                <a:rPr lang="de-DE" sz="1600" dirty="0"/>
+                <a:t>Other „</a:t>
+              </a:r>
+              <a:r>
+                <a:rPr lang="de-DE" sz="1600" dirty="0" err="1"/>
+                <a:t>black</a:t>
+              </a:r>
+              <a:r>
+                <a:rPr lang="de-DE" sz="1600" dirty="0"/>
+                <a:t> box“ </a:t>
+              </a:r>
+              <a:r>
+                <a:rPr lang="de-DE" sz="1600" dirty="0" err="1"/>
+                <a:t>control</a:t>
+              </a:r>
+              <a:r>
+                <a:rPr lang="de-DE" sz="1600" dirty="0"/>
+                <a:t> </a:t>
+              </a:r>
+              <a:r>
+                <a:rPr lang="de-DE" sz="1600" dirty="0" err="1"/>
+                <a:t>systems</a:t>
+              </a:r>
+              <a:endParaRPr lang="de-DE" sz="1050" dirty="0"/>
+            </a:p>
+          </p:txBody>
+        </p:sp>
+        <p:sp>
+          <p:nvSpPr>
+            <p:cNvPr id="214" name="Rechteck 213">
+              <a:extLst>
+                <a:ext uri="{FF2B5EF4-FFF2-40B4-BE49-F238E27FC236}">
+                  <a16:creationId xmlns:a16="http://schemas.microsoft.com/office/drawing/2014/main" id="{5033FBE7-2D09-480F-B079-8F6BA3AE49E3}"/>
+                </a:ext>
+              </a:extLst>
+            </p:cNvPr>
+            <p:cNvSpPr/>
+            <p:nvPr/>
+          </p:nvSpPr>
+          <p:spPr>
+            <a:xfrm>
+              <a:off x="6977698" y="5987630"/>
+              <a:ext cx="98856" cy="101457"/>
+            </a:xfrm>
+            <a:prstGeom prst="rect">
+              <a:avLst/>
+            </a:prstGeom>
+          </p:spPr>
+          <p:style>
+            <a:lnRef idx="1">
+              <a:schemeClr val="dk1"/>
+            </a:lnRef>
+            <a:fillRef idx="2">
+              <a:schemeClr val="dk1"/>
+            </a:fillRef>
+            <a:effectRef idx="1">
+              <a:schemeClr val="dk1"/>
+            </a:effectRef>
+            <a:fontRef idx="minor">
+              <a:schemeClr val="dk1"/>
+            </a:fontRef>
+          </p:style>
+          <p:txBody>
+            <a:bodyPr rtlCol="0" anchor="ctr"/>
+            <a:lstStyle/>
+            <a:p>
+              <a:pPr algn="ctr"/>
+              <a:endParaRPr lang="de-DE"/>
+            </a:p>
+          </p:txBody>
+        </p:sp>
+        <p:sp>
+          <p:nvSpPr>
+            <p:cNvPr id="216" name="Rechteck 215">
+              <a:extLst>
+                <a:ext uri="{FF2B5EF4-FFF2-40B4-BE49-F238E27FC236}">
+                  <a16:creationId xmlns:a16="http://schemas.microsoft.com/office/drawing/2014/main" id="{BA32EB01-3AEE-47FE-A448-7EB2E4FF08EA}"/>
+                </a:ext>
+              </a:extLst>
+            </p:cNvPr>
+            <p:cNvSpPr/>
+            <p:nvPr/>
+          </p:nvSpPr>
+          <p:spPr>
+            <a:xfrm>
+              <a:off x="6985087" y="6055021"/>
+              <a:ext cx="86001" cy="29204"/>
+            </a:xfrm>
+            <a:prstGeom prst="rect">
+              <a:avLst/>
+            </a:prstGeom>
+          </p:spPr>
+          <p:style>
+            <a:lnRef idx="2">
+              <a:schemeClr val="accent3">
+                <a:shade val="50000"/>
+              </a:schemeClr>
+            </a:lnRef>
+            <a:fillRef idx="1">
+              <a:schemeClr val="accent3"/>
+            </a:fillRef>
+            <a:effectRef idx="0">
+              <a:schemeClr val="accent3"/>
+            </a:effectRef>
+            <a:fontRef idx="minor">
+              <a:schemeClr val="lt1"/>
+            </a:fontRef>
+          </p:style>
+          <p:txBody>
+            <a:bodyPr rtlCol="0" anchor="ctr"/>
+            <a:lstStyle/>
+            <a:p>
+              <a:pPr algn="ctr"/>
+              <a:endParaRPr lang="de-DE"/>
+            </a:p>
+          </p:txBody>
+        </p:sp>
+      </p:grpSp>
+      <p:cxnSp>
+        <p:nvCxnSpPr>
+          <p:cNvPr id="217" name="Verbinder: gewinkelt 216">
+            <a:extLst>
+              <a:ext uri="{FF2B5EF4-FFF2-40B4-BE49-F238E27FC236}">
+                <a16:creationId xmlns:a16="http://schemas.microsoft.com/office/drawing/2014/main" id="{D61FDABF-47D9-44EF-B979-CFA5F3F888FC}"/>
+              </a:ext>
+            </a:extLst>
+          </p:cNvPr>
+          <p:cNvCxnSpPr>
+            <a:cxnSpLocks/>
+            <a:stCxn id="173" idx="2"/>
+            <a:endCxn id="214" idx="2"/>
+          </p:cNvCxnSpPr>
+          <p:nvPr/>
+        </p:nvCxnSpPr>
+        <p:spPr>
+          <a:xfrm rot="5400000" flipH="1">
+            <a:off x="7674502" y="5441711"/>
+            <a:ext cx="12690" cy="1307442"/>
+          </a:xfrm>
+          <a:prstGeom prst="bentConnector3">
+            <a:avLst>
+              <a:gd name="adj1" fmla="val -3352640"/>
+            </a:avLst>
+          </a:prstGeom>
+          <a:ln>
+            <a:solidFill>
+              <a:schemeClr val="accent6">
+                <a:lumMod val="40000"/>
+                <a:lumOff val="60000"/>
+              </a:schemeClr>
+            </a:solidFill>
+          </a:ln>
+        </p:spPr>
+        <p:style>
+          <a:lnRef idx="3">
+            <a:schemeClr val="accent6"/>
+          </a:lnRef>
+          <a:fillRef idx="0">
+            <a:schemeClr val="accent6"/>
+          </a:fillRef>
+          <a:effectRef idx="2">
+            <a:schemeClr val="accent6"/>
+          </a:effectRef>
+          <a:fontRef idx="minor">
+            <a:schemeClr val="tx1"/>
+          </a:fontRef>
+        </p:style>
+      </p:cxnSp>
+      <p:cxnSp>
+        <p:nvCxnSpPr>
+          <p:cNvPr id="218" name="Verbinder: gewinkelt 217">
+            <a:extLst>
+              <a:ext uri="{FF2B5EF4-FFF2-40B4-BE49-F238E27FC236}">
+                <a16:creationId xmlns:a16="http://schemas.microsoft.com/office/drawing/2014/main" id="{9068FAFE-666B-477E-B252-139651A2F6C6}"/>
+              </a:ext>
+            </a:extLst>
+          </p:cNvPr>
+          <p:cNvCxnSpPr>
+            <a:cxnSpLocks/>
+            <a:stCxn id="176" idx="2"/>
+            <a:endCxn id="50" idx="2"/>
+          </p:cNvCxnSpPr>
+          <p:nvPr/>
+        </p:nvCxnSpPr>
+        <p:spPr>
+          <a:xfrm rot="5400000" flipH="1">
+            <a:off x="7459675" y="5368469"/>
+            <a:ext cx="758101" cy="711519"/>
+          </a:xfrm>
+          <a:prstGeom prst="bentConnector3">
+            <a:avLst>
+              <a:gd name="adj1" fmla="val -43556"/>
+            </a:avLst>
+          </a:prstGeom>
+          <a:ln>
+            <a:solidFill>
+              <a:schemeClr val="accent6">
+                <a:lumMod val="40000"/>
+                <a:lumOff val="60000"/>
+              </a:schemeClr>
+            </a:solidFill>
+          </a:ln>
+        </p:spPr>
+        <p:style>
+          <a:lnRef idx="3">
+            <a:schemeClr val="accent6"/>
+          </a:lnRef>
+          <a:fillRef idx="0">
+            <a:schemeClr val="accent6"/>
+          </a:fillRef>
+          <a:effectRef idx="2">
+            <a:schemeClr val="accent6"/>
+          </a:effectRef>
+          <a:fontRef idx="minor">
+            <a:schemeClr val="tx1"/>
+          </a:fontRef>
+        </p:style>
+      </p:cxnSp>
+      <p:sp>
+        <p:nvSpPr>
+          <p:cNvPr id="219" name="Textfeld 218">
+            <a:extLst>
+              <a:ext uri="{FF2B5EF4-FFF2-40B4-BE49-F238E27FC236}">
+                <a16:creationId xmlns:a16="http://schemas.microsoft.com/office/drawing/2014/main" id="{2B82680E-7680-4F1C-B134-F057FF886CC1}"/>
+              </a:ext>
+            </a:extLst>
+          </p:cNvPr>
+          <p:cNvSpPr txBox="1"/>
+          <p:nvPr/>
+        </p:nvSpPr>
+        <p:spPr>
+          <a:xfrm>
+            <a:off x="6759806" y="6145276"/>
+            <a:ext cx="292388" cy="387286"/>
+          </a:xfrm>
+          <a:prstGeom prst="rect">
+            <a:avLst/>
+          </a:prstGeom>
+          <a:noFill/>
+        </p:spPr>
+        <p:txBody>
+          <a:bodyPr vert="vert270" wrap="square" rtlCol="0">
+            <a:spAutoFit/>
+          </a:bodyPr>
+          <a:lstStyle/>
+          <a:p>
+            <a:pPr algn="r"/>
+            <a:r>
+              <a:rPr lang="de-DE" sz="700" i="1" dirty="0"/>
+              <a:t>OPC-UA</a:t>
+            </a:r>
+          </a:p>
+        </p:txBody>
+      </p:sp>
     </p:spTree>
     <p:extLst>
       <p:ext uri="{BB962C8B-B14F-4D97-AF65-F5344CB8AC3E}">

</xml_diff>

<commit_message>
Changed Switch to managed Switch
</commit_message>
<xml_diff>
--- a/Diagramms/IoT_Concept_Basic_Architecture.pptx
+++ b/Diagramms/IoT_Concept_Basic_Architecture.pptx
@@ -5919,9 +5919,9 @@
           <p:nvPr/>
         </p:nvCxnSpPr>
         <p:spPr>
-          <a:xfrm flipV="1">
-            <a:off x="4590907" y="2590263"/>
-            <a:ext cx="1" cy="310177"/>
+          <a:xfrm flipH="1" flipV="1">
+            <a:off x="4905163" y="2580902"/>
+            <a:ext cx="1" cy="303157"/>
           </a:xfrm>
           <a:prstGeom prst="line">
             <a:avLst/>
@@ -5961,13 +5961,14 @@
           </p:cNvPr>
           <p:cNvCxnSpPr>
             <a:cxnSpLocks/>
+            <a:endCxn id="33" idx="2"/>
           </p:cNvCxnSpPr>
           <p:nvPr/>
         </p:nvCxnSpPr>
         <p:spPr>
           <a:xfrm flipV="1">
-            <a:off x="5292029" y="2586393"/>
-            <a:ext cx="1" cy="310177"/>
+            <a:off x="5450929" y="2590263"/>
+            <a:ext cx="4831" cy="294513"/>
           </a:xfrm>
           <a:prstGeom prst="line">
             <a:avLst/>
@@ -7076,48 +7077,6 @@
           </a:p>
         </p:txBody>
       </p:sp>
-      <p:cxnSp>
-        <p:nvCxnSpPr>
-          <p:cNvPr id="169" name="Verbinder: gewinkelt 168">
-            <a:extLst>
-              <a:ext uri="{FF2B5EF4-FFF2-40B4-BE49-F238E27FC236}">
-                <a16:creationId xmlns:a16="http://schemas.microsoft.com/office/drawing/2014/main" id="{290006E8-429C-4A71-89A8-901AFDC73F0A}"/>
-              </a:ext>
-            </a:extLst>
-          </p:cNvPr>
-          <p:cNvCxnSpPr>
-            <a:cxnSpLocks/>
-            <a:stCxn id="54" idx="2"/>
-            <a:endCxn id="131" idx="2"/>
-          </p:cNvCxnSpPr>
-          <p:nvPr/>
-        </p:nvCxnSpPr>
-        <p:spPr>
-          <a:xfrm rot="5400000">
-            <a:off x="4401041" y="3187579"/>
-            <a:ext cx="756051" cy="5061523"/>
-          </a:xfrm>
-          <a:prstGeom prst="bentConnector3">
-            <a:avLst>
-              <a:gd name="adj1" fmla="val 188027"/>
-            </a:avLst>
-          </a:prstGeom>
-        </p:spPr>
-        <p:style>
-          <a:lnRef idx="3">
-            <a:schemeClr val="dk1"/>
-          </a:lnRef>
-          <a:fillRef idx="0">
-            <a:schemeClr val="dk1"/>
-          </a:fillRef>
-          <a:effectRef idx="2">
-            <a:schemeClr val="dk1"/>
-          </a:effectRef>
-          <a:fontRef idx="minor">
-            <a:schemeClr val="tx1"/>
-          </a:fontRef>
-        </p:style>
-      </p:cxnSp>
       <p:sp>
         <p:nvSpPr>
           <p:cNvPr id="181" name="Textfeld 180">
@@ -7943,7 +7902,7 @@
         </p:nvSpPr>
         <p:spPr>
           <a:xfrm>
-            <a:off x="5060371" y="2580902"/>
+            <a:off x="5224060" y="2599336"/>
             <a:ext cx="292388" cy="278281"/>
           </a:xfrm>
           <a:prstGeom prst="rect">
@@ -8083,7 +8042,7 @@
         </p:nvSpPr>
         <p:spPr>
           <a:xfrm>
-            <a:off x="4583379" y="6140579"/>
+            <a:off x="4651583" y="6143591"/>
             <a:ext cx="292388" cy="387286"/>
           </a:xfrm>
           <a:prstGeom prst="rect">
@@ -8190,8 +8149,8 @@
         </p:nvSpPr>
         <p:spPr>
           <a:xfrm>
-            <a:off x="4703612" y="2909646"/>
-            <a:ext cx="1895071" cy="200055"/>
+            <a:off x="4856741" y="2901985"/>
+            <a:ext cx="1311578" cy="200055"/>
           </a:xfrm>
           <a:prstGeom prst="rect">
             <a:avLst/>
@@ -8206,15 +8165,7 @@
           <a:p>
             <a:r>
               <a:rPr lang="de-DE" sz="700" i="1" dirty="0"/>
-              <a:t>(Modbus and/</a:t>
-            </a:r>
-            <a:r>
-              <a:rPr lang="de-DE" sz="700" i="1" dirty="0" err="1"/>
-              <a:t>or</a:t>
-            </a:r>
-            <a:r>
-              <a:rPr lang="de-DE" sz="700" i="1" dirty="0"/>
-              <a:t> OPC-UA </a:t>
+              <a:t>(Modbus </a:t>
             </a:r>
             <a:r>
               <a:rPr lang="de-DE" sz="700" i="1" dirty="0" err="1"/>
@@ -8662,7 +8613,7 @@
         </p:nvSpPr>
         <p:spPr>
           <a:xfrm>
-            <a:off x="4356825" y="2575281"/>
+            <a:off x="4844513" y="2549939"/>
             <a:ext cx="292388" cy="380873"/>
           </a:xfrm>
           <a:prstGeom prst="rect">
@@ -8776,15 +8727,30 @@
             </a:fontRef>
           </p:style>
           <p:txBody>
-            <a:bodyPr rtlCol="0" anchor="ctr"/>
+            <a:bodyPr rtlCol="0" anchor="t"/>
             <a:lstStyle/>
             <a:p>
               <a:pPr algn="ctr"/>
               <a:r>
-                <a:rPr lang="de-DE" sz="1600" dirty="0"/>
+                <a:rPr lang="de-DE" sz="1200" dirty="0"/>
                 <a:t>SWITCH</a:t>
               </a:r>
-              <a:endParaRPr lang="de-DE" dirty="0"/>
+              <a:endParaRPr lang="de-DE" sz="1600" dirty="0"/>
+            </a:p>
+            <a:p>
+              <a:pPr algn="ctr"/>
+              <a:r>
+                <a:rPr lang="de-DE" sz="800" dirty="0"/>
+                <a:t>(</a:t>
+              </a:r>
+              <a:r>
+                <a:rPr lang="de-DE" sz="800" dirty="0" err="1"/>
+                <a:t>managed</a:t>
+              </a:r>
+              <a:r>
+                <a:rPr lang="de-DE" sz="800" dirty="0"/>
+                <a:t>)</a:t>
+              </a:r>
             </a:p>
           </p:txBody>
         </p:sp>
@@ -10649,14 +10615,6 @@
               </a:r>
               <a:r>
                 <a:rPr lang="de-DE" sz="1600" dirty="0" err="1"/>
-                <a:t>control</a:t>
-              </a:r>
-              <a:r>
-                <a:rPr lang="de-DE" sz="1600" dirty="0"/>
-                <a:t> </a:t>
-              </a:r>
-              <a:r>
-                <a:rPr lang="de-DE" sz="1600" dirty="0" err="1"/>
                 <a:t>systems</a:t>
               </a:r>
               <a:endParaRPr lang="de-DE" sz="1050" dirty="0"/>
@@ -10890,6 +10848,48 @@
           </a:p>
         </p:txBody>
       </p:sp>
+      <p:cxnSp>
+        <p:nvCxnSpPr>
+          <p:cNvPr id="169" name="Verbinder: gewinkelt 168">
+            <a:extLst>
+              <a:ext uri="{FF2B5EF4-FFF2-40B4-BE49-F238E27FC236}">
+                <a16:creationId xmlns:a16="http://schemas.microsoft.com/office/drawing/2014/main" id="{290006E8-429C-4A71-89A8-901AFDC73F0A}"/>
+              </a:ext>
+            </a:extLst>
+          </p:cNvPr>
+          <p:cNvCxnSpPr>
+            <a:cxnSpLocks/>
+            <a:stCxn id="54" idx="2"/>
+            <a:endCxn id="131" idx="2"/>
+          </p:cNvCxnSpPr>
+          <p:nvPr/>
+        </p:nvCxnSpPr>
+        <p:spPr>
+          <a:xfrm rot="5400000">
+            <a:off x="4401041" y="3187579"/>
+            <a:ext cx="756051" cy="5061523"/>
+          </a:xfrm>
+          <a:prstGeom prst="bentConnector3">
+            <a:avLst>
+              <a:gd name="adj1" fmla="val 188027"/>
+            </a:avLst>
+          </a:prstGeom>
+        </p:spPr>
+        <p:style>
+          <a:lnRef idx="3">
+            <a:schemeClr val="dk1"/>
+          </a:lnRef>
+          <a:fillRef idx="0">
+            <a:schemeClr val="dk1"/>
+          </a:fillRef>
+          <a:effectRef idx="2">
+            <a:schemeClr val="dk1"/>
+          </a:effectRef>
+          <a:fontRef idx="minor">
+            <a:schemeClr val="tx1"/>
+          </a:fontRef>
+        </p:style>
+      </p:cxnSp>
     </p:spTree>
     <p:extLst>
       <p:ext uri="{BB962C8B-B14F-4D97-AF65-F5344CB8AC3E}">

</xml_diff>

<commit_message>
Added http-engineering connection to SCADA-Container in Schema
</commit_message>
<xml_diff>
--- a/Diagramms/IoT_Concept_Basic_Architecture.pptx
+++ b/Diagramms/IoT_Concept_Basic_Architecture.pptx
@@ -197,7 +197,7 @@
           <a:p>
             <a:fld id="{98E5A0E9-E8EB-4B2F-B9FE-EA71FB6CA681}" type="datetimeFigureOut">
               <a:rPr lang="de-DE" smtClean="0"/>
-              <a:t>21.07.2020</a:t>
+              <a:t>23.07.2020</a:t>
             </a:fld>
             <a:endParaRPr lang="de-DE"/>
           </a:p>
@@ -611,7 +611,7 @@
           <a:p>
             <a:fld id="{B2781510-CB02-4453-BCA8-C07E5FD3A014}" type="datetimeFigureOut">
               <a:rPr lang="de-DE" smtClean="0"/>
-              <a:t>21.07.2020</a:t>
+              <a:t>23.07.2020</a:t>
             </a:fld>
             <a:endParaRPr lang="de-DE"/>
           </a:p>
@@ -809,7 +809,7 @@
           <a:p>
             <a:fld id="{B2781510-CB02-4453-BCA8-C07E5FD3A014}" type="datetimeFigureOut">
               <a:rPr lang="de-DE" smtClean="0"/>
-              <a:t>21.07.2020</a:t>
+              <a:t>23.07.2020</a:t>
             </a:fld>
             <a:endParaRPr lang="de-DE"/>
           </a:p>
@@ -1017,7 +1017,7 @@
           <a:p>
             <a:fld id="{B2781510-CB02-4453-BCA8-C07E5FD3A014}" type="datetimeFigureOut">
               <a:rPr lang="de-DE" smtClean="0"/>
-              <a:t>21.07.2020</a:t>
+              <a:t>23.07.2020</a:t>
             </a:fld>
             <a:endParaRPr lang="de-DE"/>
           </a:p>
@@ -1215,7 +1215,7 @@
           <a:p>
             <a:fld id="{B2781510-CB02-4453-BCA8-C07E5FD3A014}" type="datetimeFigureOut">
               <a:rPr lang="de-DE" smtClean="0"/>
-              <a:t>21.07.2020</a:t>
+              <a:t>23.07.2020</a:t>
             </a:fld>
             <a:endParaRPr lang="de-DE"/>
           </a:p>
@@ -1490,7 +1490,7 @@
           <a:p>
             <a:fld id="{B2781510-CB02-4453-BCA8-C07E5FD3A014}" type="datetimeFigureOut">
               <a:rPr lang="de-DE" smtClean="0"/>
-              <a:t>21.07.2020</a:t>
+              <a:t>23.07.2020</a:t>
             </a:fld>
             <a:endParaRPr lang="de-DE"/>
           </a:p>
@@ -1755,7 +1755,7 @@
           <a:p>
             <a:fld id="{B2781510-CB02-4453-BCA8-C07E5FD3A014}" type="datetimeFigureOut">
               <a:rPr lang="de-DE" smtClean="0"/>
-              <a:t>21.07.2020</a:t>
+              <a:t>23.07.2020</a:t>
             </a:fld>
             <a:endParaRPr lang="de-DE"/>
           </a:p>
@@ -2167,7 +2167,7 @@
           <a:p>
             <a:fld id="{B2781510-CB02-4453-BCA8-C07E5FD3A014}" type="datetimeFigureOut">
               <a:rPr lang="de-DE" smtClean="0"/>
-              <a:t>21.07.2020</a:t>
+              <a:t>23.07.2020</a:t>
             </a:fld>
             <a:endParaRPr lang="de-DE"/>
           </a:p>
@@ -2308,7 +2308,7 @@
           <a:p>
             <a:fld id="{B2781510-CB02-4453-BCA8-C07E5FD3A014}" type="datetimeFigureOut">
               <a:rPr lang="de-DE" smtClean="0"/>
-              <a:t>21.07.2020</a:t>
+              <a:t>23.07.2020</a:t>
             </a:fld>
             <a:endParaRPr lang="de-DE"/>
           </a:p>
@@ -2421,7 +2421,7 @@
           <a:p>
             <a:fld id="{B2781510-CB02-4453-BCA8-C07E5FD3A014}" type="datetimeFigureOut">
               <a:rPr lang="de-DE" smtClean="0"/>
-              <a:t>21.07.2020</a:t>
+              <a:t>23.07.2020</a:t>
             </a:fld>
             <a:endParaRPr lang="de-DE"/>
           </a:p>
@@ -2732,7 +2732,7 @@
           <a:p>
             <a:fld id="{B2781510-CB02-4453-BCA8-C07E5FD3A014}" type="datetimeFigureOut">
               <a:rPr lang="de-DE" smtClean="0"/>
-              <a:t>21.07.2020</a:t>
+              <a:t>23.07.2020</a:t>
             </a:fld>
             <a:endParaRPr lang="de-DE"/>
           </a:p>
@@ -3020,7 +3020,7 @@
           <a:p>
             <a:fld id="{B2781510-CB02-4453-BCA8-C07E5FD3A014}" type="datetimeFigureOut">
               <a:rPr lang="de-DE" smtClean="0"/>
-              <a:t>21.07.2020</a:t>
+              <a:t>23.07.2020</a:t>
             </a:fld>
             <a:endParaRPr lang="de-DE"/>
           </a:p>
@@ -3261,7 +3261,7 @@
           <a:p>
             <a:fld id="{B2781510-CB02-4453-BCA8-C07E5FD3A014}" type="datetimeFigureOut">
               <a:rPr lang="de-DE" smtClean="0"/>
-              <a:t>21.07.2020</a:t>
+              <a:t>23.07.2020</a:t>
             </a:fld>
             <a:endParaRPr lang="de-DE"/>
           </a:p>
@@ -6217,8 +6217,8 @@
         </p:nvCxnSpPr>
         <p:spPr>
           <a:xfrm flipV="1">
-            <a:off x="4158525" y="2896571"/>
-            <a:ext cx="542263" cy="3869"/>
+            <a:off x="4158525" y="2900441"/>
+            <a:ext cx="370723" cy="1"/>
           </a:xfrm>
           <a:prstGeom prst="line">
             <a:avLst/>
@@ -9747,7 +9747,7 @@
           <a:p>
             <a:fld id="{EA6C8BFA-6DE6-4FA5-862A-F688C711234C}" type="datetime1">
               <a:rPr lang="de-DE" smtClean="0"/>
-              <a:t>21.07.2020</a:t>
+              <a:t>23.07.2020</a:t>
             </a:fld>
             <a:endParaRPr lang="de-DE" dirty="0"/>
           </a:p>
@@ -10890,6 +10890,145 @@
           </a:fontRef>
         </p:style>
       </p:cxnSp>
+      <p:cxnSp>
+        <p:nvCxnSpPr>
+          <p:cNvPr id="196" name="Gerader Verbinder 195">
+            <a:extLst>
+              <a:ext uri="{FF2B5EF4-FFF2-40B4-BE49-F238E27FC236}">
+                <a16:creationId xmlns:a16="http://schemas.microsoft.com/office/drawing/2014/main" id="{7E4137D5-9AEC-49BA-B199-A2F8C973249E}"/>
+              </a:ext>
+            </a:extLst>
+          </p:cNvPr>
+          <p:cNvCxnSpPr>
+            <a:cxnSpLocks/>
+          </p:cNvCxnSpPr>
+          <p:nvPr/>
+        </p:nvCxnSpPr>
+        <p:spPr>
+          <a:xfrm flipV="1">
+            <a:off x="4563895" y="2590262"/>
+            <a:ext cx="0" cy="605492"/>
+          </a:xfrm>
+          <a:prstGeom prst="line">
+            <a:avLst/>
+          </a:prstGeom>
+          <a:ln w="9525" cap="flat" cmpd="sng" algn="ctr">
+            <a:solidFill>
+              <a:schemeClr val="accent4">
+                <a:lumMod val="40000"/>
+                <a:lumOff val="60000"/>
+              </a:schemeClr>
+            </a:solidFill>
+            <a:prstDash val="dash"/>
+            <a:round/>
+            <a:headEnd type="none" w="med" len="med"/>
+            <a:tailEnd type="none" w="med" len="med"/>
+          </a:ln>
+        </p:spPr>
+        <p:style>
+          <a:lnRef idx="0">
+            <a:scrgbClr r="0" g="0" b="0"/>
+          </a:lnRef>
+          <a:fillRef idx="0">
+            <a:scrgbClr r="0" g="0" b="0"/>
+          </a:fillRef>
+          <a:effectRef idx="0">
+            <a:scrgbClr r="0" g="0" b="0"/>
+          </a:effectRef>
+          <a:fontRef idx="minor">
+            <a:schemeClr val="tx1"/>
+          </a:fontRef>
+        </p:style>
+      </p:cxnSp>
+      <p:cxnSp>
+        <p:nvCxnSpPr>
+          <p:cNvPr id="213" name="Gerader Verbinder 212">
+            <a:extLst>
+              <a:ext uri="{FF2B5EF4-FFF2-40B4-BE49-F238E27FC236}">
+                <a16:creationId xmlns:a16="http://schemas.microsoft.com/office/drawing/2014/main" id="{938A0DD2-173A-41BB-869C-DD393600DFB5}"/>
+              </a:ext>
+            </a:extLst>
+          </p:cNvPr>
+          <p:cNvCxnSpPr>
+            <a:cxnSpLocks/>
+          </p:cNvCxnSpPr>
+          <p:nvPr/>
+        </p:nvCxnSpPr>
+        <p:spPr>
+          <a:xfrm>
+            <a:off x="4588991" y="2897006"/>
+            <a:ext cx="112640" cy="0"/>
+          </a:xfrm>
+          <a:prstGeom prst="line">
+            <a:avLst/>
+          </a:prstGeom>
+          <a:ln>
+            <a:solidFill>
+              <a:schemeClr val="accent6">
+                <a:lumMod val="40000"/>
+                <a:lumOff val="60000"/>
+              </a:schemeClr>
+            </a:solidFill>
+          </a:ln>
+        </p:spPr>
+        <p:style>
+          <a:lnRef idx="3">
+            <a:schemeClr val="accent6"/>
+          </a:lnRef>
+          <a:fillRef idx="0">
+            <a:schemeClr val="accent6"/>
+          </a:fillRef>
+          <a:effectRef idx="2">
+            <a:schemeClr val="accent6"/>
+          </a:effectRef>
+          <a:fontRef idx="minor">
+            <a:schemeClr val="tx1"/>
+          </a:fontRef>
+        </p:style>
+      </p:cxnSp>
+      <p:sp>
+        <p:nvSpPr>
+          <p:cNvPr id="220" name="Textfeld 219">
+            <a:extLst>
+              <a:ext uri="{FF2B5EF4-FFF2-40B4-BE49-F238E27FC236}">
+                <a16:creationId xmlns:a16="http://schemas.microsoft.com/office/drawing/2014/main" id="{1A02EE28-2096-4AF0-B676-E3B3821A5FEA}"/>
+              </a:ext>
+            </a:extLst>
+          </p:cNvPr>
+          <p:cNvSpPr txBox="1"/>
+          <p:nvPr/>
+        </p:nvSpPr>
+        <p:spPr>
+          <a:xfrm>
+            <a:off x="4372438" y="2551462"/>
+            <a:ext cx="261610" cy="682238"/>
+          </a:xfrm>
+          <a:prstGeom prst="rect">
+            <a:avLst/>
+          </a:prstGeom>
+          <a:noFill/>
+        </p:spPr>
+        <p:txBody>
+          <a:bodyPr vert="vert270" wrap="none" rtlCol="0">
+            <a:spAutoFit/>
+          </a:bodyPr>
+          <a:lstStyle/>
+          <a:p>
+            <a:r>
+              <a:rPr lang="de-DE" sz="500" i="1" dirty="0"/>
+              <a:t>(HTTP </a:t>
+            </a:r>
+            <a:r>
+              <a:rPr lang="de-DE" sz="500" i="1" dirty="0" err="1"/>
+              <a:t>for</a:t>
+            </a:r>
+            <a:r>
+              <a:rPr lang="de-DE" sz="500" i="1" dirty="0"/>
+              <a:t> Engineering)</a:t>
+            </a:r>
+          </a:p>
+        </p:txBody>
+      </p:sp>
     </p:spTree>
     <p:extLst>
       <p:ext uri="{BB962C8B-B14F-4D97-AF65-F5344CB8AC3E}">

</xml_diff>

<commit_message>
Changed Windows server to linux for PLC
</commit_message>
<xml_diff>
--- a/Diagramms/IoT_Concept_Basic_Architecture.pptx
+++ b/Diagramms/IoT_Concept_Basic_Architecture.pptx
@@ -197,7 +197,7 @@
           <a:p>
             <a:fld id="{98E5A0E9-E8EB-4B2F-B9FE-EA71FB6CA681}" type="datetimeFigureOut">
               <a:rPr lang="de-DE" smtClean="0"/>
-              <a:t>23.07.2020</a:t>
+              <a:t>31.07.2020</a:t>
             </a:fld>
             <a:endParaRPr lang="de-DE"/>
           </a:p>
@@ -611,7 +611,7 @@
           <a:p>
             <a:fld id="{B2781510-CB02-4453-BCA8-C07E5FD3A014}" type="datetimeFigureOut">
               <a:rPr lang="de-DE" smtClean="0"/>
-              <a:t>23.07.2020</a:t>
+              <a:t>31.07.2020</a:t>
             </a:fld>
             <a:endParaRPr lang="de-DE"/>
           </a:p>
@@ -809,7 +809,7 @@
           <a:p>
             <a:fld id="{B2781510-CB02-4453-BCA8-C07E5FD3A014}" type="datetimeFigureOut">
               <a:rPr lang="de-DE" smtClean="0"/>
-              <a:t>23.07.2020</a:t>
+              <a:t>31.07.2020</a:t>
             </a:fld>
             <a:endParaRPr lang="de-DE"/>
           </a:p>
@@ -1017,7 +1017,7 @@
           <a:p>
             <a:fld id="{B2781510-CB02-4453-BCA8-C07E5FD3A014}" type="datetimeFigureOut">
               <a:rPr lang="de-DE" smtClean="0"/>
-              <a:t>23.07.2020</a:t>
+              <a:t>31.07.2020</a:t>
             </a:fld>
             <a:endParaRPr lang="de-DE"/>
           </a:p>
@@ -1215,7 +1215,7 @@
           <a:p>
             <a:fld id="{B2781510-CB02-4453-BCA8-C07E5FD3A014}" type="datetimeFigureOut">
               <a:rPr lang="de-DE" smtClean="0"/>
-              <a:t>23.07.2020</a:t>
+              <a:t>31.07.2020</a:t>
             </a:fld>
             <a:endParaRPr lang="de-DE"/>
           </a:p>
@@ -1490,7 +1490,7 @@
           <a:p>
             <a:fld id="{B2781510-CB02-4453-BCA8-C07E5FD3A014}" type="datetimeFigureOut">
               <a:rPr lang="de-DE" smtClean="0"/>
-              <a:t>23.07.2020</a:t>
+              <a:t>31.07.2020</a:t>
             </a:fld>
             <a:endParaRPr lang="de-DE"/>
           </a:p>
@@ -1755,7 +1755,7 @@
           <a:p>
             <a:fld id="{B2781510-CB02-4453-BCA8-C07E5FD3A014}" type="datetimeFigureOut">
               <a:rPr lang="de-DE" smtClean="0"/>
-              <a:t>23.07.2020</a:t>
+              <a:t>31.07.2020</a:t>
             </a:fld>
             <a:endParaRPr lang="de-DE"/>
           </a:p>
@@ -2167,7 +2167,7 @@
           <a:p>
             <a:fld id="{B2781510-CB02-4453-BCA8-C07E5FD3A014}" type="datetimeFigureOut">
               <a:rPr lang="de-DE" smtClean="0"/>
-              <a:t>23.07.2020</a:t>
+              <a:t>31.07.2020</a:t>
             </a:fld>
             <a:endParaRPr lang="de-DE"/>
           </a:p>
@@ -2308,7 +2308,7 @@
           <a:p>
             <a:fld id="{B2781510-CB02-4453-BCA8-C07E5FD3A014}" type="datetimeFigureOut">
               <a:rPr lang="de-DE" smtClean="0"/>
-              <a:t>23.07.2020</a:t>
+              <a:t>31.07.2020</a:t>
             </a:fld>
             <a:endParaRPr lang="de-DE"/>
           </a:p>
@@ -2421,7 +2421,7 @@
           <a:p>
             <a:fld id="{B2781510-CB02-4453-BCA8-C07E5FD3A014}" type="datetimeFigureOut">
               <a:rPr lang="de-DE" smtClean="0"/>
-              <a:t>23.07.2020</a:t>
+              <a:t>31.07.2020</a:t>
             </a:fld>
             <a:endParaRPr lang="de-DE"/>
           </a:p>
@@ -2732,7 +2732,7 @@
           <a:p>
             <a:fld id="{B2781510-CB02-4453-BCA8-C07E5FD3A014}" type="datetimeFigureOut">
               <a:rPr lang="de-DE" smtClean="0"/>
-              <a:t>23.07.2020</a:t>
+              <a:t>31.07.2020</a:t>
             </a:fld>
             <a:endParaRPr lang="de-DE"/>
           </a:p>
@@ -3020,7 +3020,7 @@
           <a:p>
             <a:fld id="{B2781510-CB02-4453-BCA8-C07E5FD3A014}" type="datetimeFigureOut">
               <a:rPr lang="de-DE" smtClean="0"/>
-              <a:t>23.07.2020</a:t>
+              <a:t>31.07.2020</a:t>
             </a:fld>
             <a:endParaRPr lang="de-DE"/>
           </a:p>
@@ -3261,7 +3261,7 @@
           <a:p>
             <a:fld id="{B2781510-CB02-4453-BCA8-C07E5FD3A014}" type="datetimeFigureOut">
               <a:rPr lang="de-DE" smtClean="0"/>
-              <a:t>23.07.2020</a:t>
+              <a:t>31.07.2020</a:t>
             </a:fld>
             <a:endParaRPr lang="de-DE"/>
           </a:p>
@@ -3722,7 +3722,15 @@
             <a:pPr algn="ctr"/>
             <a:r>
               <a:rPr lang="de-DE" dirty="0"/>
-              <a:t>Bare Metall / Hardwareplattform</a:t>
+              <a:t>Any bare </a:t>
+            </a:r>
+            <a:r>
+              <a:rPr lang="de-DE" dirty="0" err="1"/>
+              <a:t>metall</a:t>
+            </a:r>
+            <a:r>
+              <a:rPr lang="de-DE" dirty="0"/>
+              <a:t> / Hardwareplattform</a:t>
             </a:r>
           </a:p>
         </p:txBody>
@@ -4334,8 +4342,8 @@
         </p:nvSpPr>
         <p:spPr>
           <a:xfrm>
-            <a:off x="6973661" y="1902830"/>
-            <a:ext cx="1468073" cy="2138404"/>
+            <a:off x="7058305" y="1897966"/>
+            <a:ext cx="1566878" cy="2143268"/>
           </a:xfrm>
           <a:prstGeom prst="rect">
             <a:avLst/>
@@ -4503,7 +4511,47 @@
             <a:pPr algn="ctr"/>
             <a:r>
               <a:rPr lang="de-DE" sz="1200" dirty="0"/>
-              <a:t>(Windows Server)</a:t>
+              <a:t>(</a:t>
+            </a:r>
+            <a:r>
+              <a:rPr lang="de-DE" sz="1200" dirty="0" err="1"/>
+              <a:t>headless</a:t>
+            </a:r>
+            <a:r>
+              <a:rPr lang="de-DE" sz="1200" dirty="0"/>
+              <a:t> Linux, </a:t>
+            </a:r>
+            <a:r>
+              <a:rPr lang="de-DE" sz="1200" dirty="0" err="1"/>
+              <a:t>if</a:t>
+            </a:r>
+            <a:r>
+              <a:rPr lang="de-DE" sz="1200" dirty="0"/>
+              <a:t> </a:t>
+            </a:r>
+            <a:r>
+              <a:rPr lang="de-DE" sz="1200" dirty="0" err="1"/>
+              <a:t>no</a:t>
+            </a:r>
+            <a:r>
+              <a:rPr lang="de-DE" sz="1200" dirty="0"/>
+              <a:t> such </a:t>
+            </a:r>
+            <a:r>
+              <a:rPr lang="de-DE" sz="1200" dirty="0" err="1"/>
+              <a:t>solution</a:t>
+            </a:r>
+            <a:r>
+              <a:rPr lang="de-DE" sz="1200" dirty="0"/>
+              <a:t> </a:t>
+            </a:r>
+            <a:r>
+              <a:rPr lang="de-DE" sz="1200" dirty="0" err="1"/>
+              <a:t>avaliable</a:t>
+            </a:r>
+            <a:r>
+              <a:rPr lang="de-DE" sz="1200" dirty="0"/>
+              <a:t> Windows Server)</a:t>
             </a:r>
           </a:p>
         </p:txBody>
@@ -6519,8 +6567,8 @@
         </p:nvSpPr>
         <p:spPr>
           <a:xfrm>
-            <a:off x="1795585" y="845245"/>
-            <a:ext cx="1237591" cy="3195989"/>
+            <a:off x="1736053" y="845246"/>
+            <a:ext cx="1297124" cy="3193332"/>
           </a:xfrm>
           <a:prstGeom prst="rect">
             <a:avLst/>
@@ -9747,7 +9795,7 @@
           <a:p>
             <a:fld id="{EA6C8BFA-6DE6-4FA5-862A-F688C711234C}" type="datetime1">
               <a:rPr lang="de-DE" smtClean="0"/>
-              <a:t>23.07.2020</a:t>
+              <a:t>31.07.2020</a:t>
             </a:fld>
             <a:endParaRPr lang="de-DE" dirty="0"/>
           </a:p>

</xml_diff>